<commit_message>
Corrected a few typos
</commit_message>
<xml_diff>
--- a/Meilenstein 5.pptx
+++ b/Meilenstein 5.pptx
@@ -127,11 +127,7 @@
 <file path=ppt/commentAuthors.xml><?xml version="1.0" encoding="utf-8"?>
 <p:cmAuthorLst xmlns:a="http://schemas.openxmlformats.org/drawingml/2006/main" xmlns:r="http://schemas.openxmlformats.org/officeDocument/2006/relationships" xmlns:p="http://schemas.openxmlformats.org/presentationml/2006/main">
   <p:cmAuthor id="1" name="Angel Gibbs" initials="AG" lastIdx="2" clrIdx="0">
-    <p:extLst>
-      <p:ext uri="{19B8F6BF-5375-455C-9EA6-DF929625EA0E}">
-        <p15:presenceInfo xmlns:p15="http://schemas.microsoft.com/office/powerpoint/2012/main" userId="a7439277b56abacf" providerId="Windows Live"/>
-      </p:ext>
-    </p:extLst>
+    <p:extLst/>
   </p:cmAuthor>
 </p:cmAuthorLst>
 </file>
@@ -3581,6 +3577,13 @@
         </dgm:presLayoutVars>
       </dgm:prSet>
       <dgm:spPr/>
+      <dgm:t>
+        <a:bodyPr/>
+        <a:lstStyle/>
+        <a:p>
+          <a:endParaRPr lang="de-CH"/>
+        </a:p>
+      </dgm:t>
     </dgm:pt>
     <dgm:pt modelId="{9E85ED12-C8A5-4775-862D-318BD48F56BE}" type="pres">
       <dgm:prSet presAssocID="{380DAA67-6B41-4AF6-8416-9ABEC0C60697}" presName="parentText" presStyleLbl="node1" presStyleIdx="0" presStyleCnt="2" custScaleX="99656" custScaleY="30048" custLinFactNeighborX="0" custLinFactNeighborY="-126">
@@ -3590,6 +3593,13 @@
         </dgm:presLayoutVars>
       </dgm:prSet>
       <dgm:spPr/>
+      <dgm:t>
+        <a:bodyPr/>
+        <a:lstStyle/>
+        <a:p>
+          <a:endParaRPr lang="de-CH"/>
+        </a:p>
+      </dgm:t>
     </dgm:pt>
     <dgm:pt modelId="{289EDFF2-20AB-4CD1-8E03-85CBF8C22D47}" type="pres">
       <dgm:prSet presAssocID="{380DAA67-6B41-4AF6-8416-9ABEC0C60697}" presName="childText" presStyleLbl="revTx" presStyleIdx="0" presStyleCnt="2">
@@ -3598,6 +3608,13 @@
         </dgm:presLayoutVars>
       </dgm:prSet>
       <dgm:spPr/>
+      <dgm:t>
+        <a:bodyPr/>
+        <a:lstStyle/>
+        <a:p>
+          <a:endParaRPr lang="de-CH"/>
+        </a:p>
+      </dgm:t>
     </dgm:pt>
     <dgm:pt modelId="{FA433AF0-9DB1-4284-969E-82198B0D6E7C}" type="pres">
       <dgm:prSet presAssocID="{76329A0F-D3C8-42EA-A61D-99904A3163C0}" presName="parentText" presStyleLbl="node1" presStyleIdx="1" presStyleCnt="2" custScaleY="30325" custLinFactNeighborY="55">
@@ -3607,6 +3624,13 @@
         </dgm:presLayoutVars>
       </dgm:prSet>
       <dgm:spPr/>
+      <dgm:t>
+        <a:bodyPr/>
+        <a:lstStyle/>
+        <a:p>
+          <a:endParaRPr lang="de-CH"/>
+        </a:p>
+      </dgm:t>
     </dgm:pt>
     <dgm:pt modelId="{3BC9314E-C271-4FB6-A22B-E94E320B8031}" type="pres">
       <dgm:prSet presAssocID="{76329A0F-D3C8-42EA-A61D-99904A3163C0}" presName="childText" presStyleLbl="revTx" presStyleIdx="1" presStyleCnt="2">
@@ -3615,30 +3639,37 @@
         </dgm:presLayoutVars>
       </dgm:prSet>
       <dgm:spPr/>
+      <dgm:t>
+        <a:bodyPr/>
+        <a:lstStyle/>
+        <a:p>
+          <a:endParaRPr lang="de-CH"/>
+        </a:p>
+      </dgm:t>
     </dgm:pt>
   </dgm:ptLst>
   <dgm:cxnLst>
     <dgm:cxn modelId="{EFDCAF08-5AD8-446D-8D18-761D79E7A6C5}" type="presOf" srcId="{D08F2C5C-6EA9-435A-BB4A-E305086874B8}" destId="{4DD11236-98BF-4CFE-A2F6-1957A94EA9C5}" srcOrd="0" destOrd="0" presId="urn:microsoft.com/office/officeart/2005/8/layout/vList2"/>
+    <dgm:cxn modelId="{CAB3172E-75F7-4B95-8EA8-701A80CFB1D9}" srcId="{76329A0F-D3C8-42EA-A61D-99904A3163C0}" destId="{BDF23FD8-8428-45E3-89BF-CC0DA00EB808}" srcOrd="2" destOrd="0" parTransId="{702EEDE7-EDB2-4C3E-8163-53D397D58083}" sibTransId="{C2298E8F-628D-429D-B93E-7BCAB8C66FC9}"/>
+    <dgm:cxn modelId="{B8207958-29F8-493A-8DF2-BD33462CD999}" type="presOf" srcId="{6AC21D1C-265C-42AB-89B9-D0EE903902B8}" destId="{3BC9314E-C271-4FB6-A22B-E94E320B8031}" srcOrd="0" destOrd="3" presId="urn:microsoft.com/office/officeart/2005/8/layout/vList2"/>
+    <dgm:cxn modelId="{7BB7073E-2CA3-4B82-81A4-B6A3756AB782}" srcId="{D08F2C5C-6EA9-435A-BB4A-E305086874B8}" destId="{380DAA67-6B41-4AF6-8416-9ABEC0C60697}" srcOrd="0" destOrd="0" parTransId="{E89F1DC4-6116-4E21-8665-11C157D774A5}" sibTransId="{6D3C3D3C-5C23-4C75-8E7F-1728D0AB1B22}"/>
+    <dgm:cxn modelId="{37358E88-5F65-4377-975F-6818298FCDB8}" type="presOf" srcId="{380DAA67-6B41-4AF6-8416-9ABEC0C60697}" destId="{9E85ED12-C8A5-4775-862D-318BD48F56BE}" srcOrd="0" destOrd="0" presId="urn:microsoft.com/office/officeart/2005/8/layout/vList2"/>
+    <dgm:cxn modelId="{6E994448-4D9F-4CD4-942B-E7BFF861B7F8}" srcId="{76329A0F-D3C8-42EA-A61D-99904A3163C0}" destId="{D1CFB810-9C5F-440C-99E3-186A3FCD2520}" srcOrd="0" destOrd="0" parTransId="{E4751AA4-A522-41EE-9965-B6493910AA5D}" sibTransId="{BCCFB8DB-F4CC-48C9-88DF-7855D28E9BF5}"/>
     <dgm:cxn modelId="{3D8FAC0F-9B0D-4555-9C70-ACA44B024794}" type="presOf" srcId="{4D48056A-6E41-4EAC-9860-82831A238C2E}" destId="{3BC9314E-C271-4FB6-A22B-E94E320B8031}" srcOrd="0" destOrd="1" presId="urn:microsoft.com/office/officeart/2005/8/layout/vList2"/>
     <dgm:cxn modelId="{E5DAA410-D704-401E-8A10-68850A38CC7E}" type="presOf" srcId="{DCA9900F-248B-4DC5-8C96-2DA9779273A1}" destId="{3BC9314E-C271-4FB6-A22B-E94E320B8031}" srcOrd="0" destOrd="4" presId="urn:microsoft.com/office/officeart/2005/8/layout/vList2"/>
-    <dgm:cxn modelId="{F8D37624-48E2-4C47-90C5-83C677DB88B1}" type="presOf" srcId="{D1CFB810-9C5F-440C-99E3-186A3FCD2520}" destId="{3BC9314E-C271-4FB6-A22B-E94E320B8031}" srcOrd="0" destOrd="0" presId="urn:microsoft.com/office/officeart/2005/8/layout/vList2"/>
-    <dgm:cxn modelId="{CAB3172E-75F7-4B95-8EA8-701A80CFB1D9}" srcId="{76329A0F-D3C8-42EA-A61D-99904A3163C0}" destId="{BDF23FD8-8428-45E3-89BF-CC0DA00EB808}" srcOrd="2" destOrd="0" parTransId="{702EEDE7-EDB2-4C3E-8163-53D397D58083}" sibTransId="{C2298E8F-628D-429D-B93E-7BCAB8C66FC9}"/>
-    <dgm:cxn modelId="{7BB7073E-2CA3-4B82-81A4-B6A3756AB782}" srcId="{D08F2C5C-6EA9-435A-BB4A-E305086874B8}" destId="{380DAA67-6B41-4AF6-8416-9ABEC0C60697}" srcOrd="0" destOrd="0" parTransId="{E89F1DC4-6116-4E21-8665-11C157D774A5}" sibTransId="{6D3C3D3C-5C23-4C75-8E7F-1728D0AB1B22}"/>
+    <dgm:cxn modelId="{2F6F1479-B37C-4AB4-91AC-1B6602B1DF40}" type="presOf" srcId="{76329A0F-D3C8-42EA-A61D-99904A3163C0}" destId="{FA433AF0-9DB1-4284-969E-82198B0D6E7C}" srcOrd="0" destOrd="0" presId="urn:microsoft.com/office/officeart/2005/8/layout/vList2"/>
+    <dgm:cxn modelId="{744F7689-E35E-4D7F-A2BC-1515CD3E87CF}" srcId="{76329A0F-D3C8-42EA-A61D-99904A3163C0}" destId="{4D48056A-6E41-4EAC-9860-82831A238C2E}" srcOrd="1" destOrd="0" parTransId="{3F137047-5492-4BF9-B315-0D4ED14A4B3D}" sibTransId="{9DB560BC-1067-4D41-974A-A01E4C886E90}"/>
+    <dgm:cxn modelId="{4B4FAA80-C416-4122-ADD4-444E08E8A98A}" srcId="{380DAA67-6B41-4AF6-8416-9ABEC0C60697}" destId="{CA206B68-CE8E-4B09-A460-E2F07639EC4A}" srcOrd="1" destOrd="0" parTransId="{718D9063-C723-49D5-9CEF-BE2C0CC53849}" sibTransId="{7C782CE8-2909-4CFD-A879-3A849873620A}"/>
+    <dgm:cxn modelId="{BB05AA77-73DD-4AAC-B51A-F8227F0DC58A}" srcId="{76329A0F-D3C8-42EA-A61D-99904A3163C0}" destId="{DCA9900F-248B-4DC5-8C96-2DA9779273A1}" srcOrd="4" destOrd="0" parTransId="{69C3BABB-BAA7-42D2-B5AD-6FF6DF5CA3F4}" sibTransId="{E858890C-DDCD-4792-867E-1B66E71BA168}"/>
+    <dgm:cxn modelId="{0A503F7C-E30B-47E4-8D61-2D173FF64A86}" srcId="{D08F2C5C-6EA9-435A-BB4A-E305086874B8}" destId="{76329A0F-D3C8-42EA-A61D-99904A3163C0}" srcOrd="1" destOrd="0" parTransId="{0F89C9BF-DE02-423F-9AA0-8892A5EB996F}" sibTransId="{5AFE2564-2C2E-4E1C-A97C-9413E6A76D68}"/>
+    <dgm:cxn modelId="{605C6B4F-A439-4D5A-80A5-D6828A7093BA}" type="presOf" srcId="{CF1227AB-1362-47B4-A17A-45564FF0640C}" destId="{289EDFF2-20AB-4CD1-8E03-85CBF8C22D47}" srcOrd="0" destOrd="0" presId="urn:microsoft.com/office/officeart/2005/8/layout/vList2"/>
     <dgm:cxn modelId="{DE9DEB60-5781-4605-822A-2B9E6D0E40C7}" type="presOf" srcId="{CA206B68-CE8E-4B09-A460-E2F07639EC4A}" destId="{289EDFF2-20AB-4CD1-8E03-85CBF8C22D47}" srcOrd="0" destOrd="1" presId="urn:microsoft.com/office/officeart/2005/8/layout/vList2"/>
     <dgm:cxn modelId="{8FE1BF61-D227-4168-B35D-CAA961FADFB3}" srcId="{380DAA67-6B41-4AF6-8416-9ABEC0C60697}" destId="{50906C4E-4CED-4267-BD33-C898EC919BAD}" srcOrd="2" destOrd="0" parTransId="{88AE0A6B-DDC9-4F2B-8BEC-3D04BF7346AB}" sibTransId="{9F06EB4D-D4EB-4422-84E0-DCE426C21F4E}"/>
-    <dgm:cxn modelId="{6E994448-4D9F-4CD4-942B-E7BFF861B7F8}" srcId="{76329A0F-D3C8-42EA-A61D-99904A3163C0}" destId="{D1CFB810-9C5F-440C-99E3-186A3FCD2520}" srcOrd="0" destOrd="0" parTransId="{E4751AA4-A522-41EE-9965-B6493910AA5D}" sibTransId="{BCCFB8DB-F4CC-48C9-88DF-7855D28E9BF5}"/>
-    <dgm:cxn modelId="{605C6B4F-A439-4D5A-80A5-D6828A7093BA}" type="presOf" srcId="{CF1227AB-1362-47B4-A17A-45564FF0640C}" destId="{289EDFF2-20AB-4CD1-8E03-85CBF8C22D47}" srcOrd="0" destOrd="0" presId="urn:microsoft.com/office/officeart/2005/8/layout/vList2"/>
+    <dgm:cxn modelId="{B31745DC-D49D-481E-97C6-B704D61A5BF3}" srcId="{380DAA67-6B41-4AF6-8416-9ABEC0C60697}" destId="{CF1227AB-1362-47B4-A17A-45564FF0640C}" srcOrd="0" destOrd="0" parTransId="{58E6DE28-5086-4D2D-8730-D23C09091875}" sibTransId="{2EFC4030-1E33-416A-8386-4DA2D7A92E71}"/>
     <dgm:cxn modelId="{84EBE153-5525-4ED5-9D49-BE2D6363CA31}" type="presOf" srcId="{50906C4E-4CED-4267-BD33-C898EC919BAD}" destId="{289EDFF2-20AB-4CD1-8E03-85CBF8C22D47}" srcOrd="0" destOrd="2" presId="urn:microsoft.com/office/officeart/2005/8/layout/vList2"/>
-    <dgm:cxn modelId="{BB05AA77-73DD-4AAC-B51A-F8227F0DC58A}" srcId="{76329A0F-D3C8-42EA-A61D-99904A3163C0}" destId="{DCA9900F-248B-4DC5-8C96-2DA9779273A1}" srcOrd="4" destOrd="0" parTransId="{69C3BABB-BAA7-42D2-B5AD-6FF6DF5CA3F4}" sibTransId="{E858890C-DDCD-4792-867E-1B66E71BA168}"/>
-    <dgm:cxn modelId="{B8207958-29F8-493A-8DF2-BD33462CD999}" type="presOf" srcId="{6AC21D1C-265C-42AB-89B9-D0EE903902B8}" destId="{3BC9314E-C271-4FB6-A22B-E94E320B8031}" srcOrd="0" destOrd="3" presId="urn:microsoft.com/office/officeart/2005/8/layout/vList2"/>
-    <dgm:cxn modelId="{2F6F1479-B37C-4AB4-91AC-1B6602B1DF40}" type="presOf" srcId="{76329A0F-D3C8-42EA-A61D-99904A3163C0}" destId="{FA433AF0-9DB1-4284-969E-82198B0D6E7C}" srcOrd="0" destOrd="0" presId="urn:microsoft.com/office/officeart/2005/8/layout/vList2"/>
-    <dgm:cxn modelId="{0A503F7C-E30B-47E4-8D61-2D173FF64A86}" srcId="{D08F2C5C-6EA9-435A-BB4A-E305086874B8}" destId="{76329A0F-D3C8-42EA-A61D-99904A3163C0}" srcOrd="1" destOrd="0" parTransId="{0F89C9BF-DE02-423F-9AA0-8892A5EB996F}" sibTransId="{5AFE2564-2C2E-4E1C-A97C-9413E6A76D68}"/>
-    <dgm:cxn modelId="{4B4FAA80-C416-4122-ADD4-444E08E8A98A}" srcId="{380DAA67-6B41-4AF6-8416-9ABEC0C60697}" destId="{CA206B68-CE8E-4B09-A460-E2F07639EC4A}" srcOrd="1" destOrd="0" parTransId="{718D9063-C723-49D5-9CEF-BE2C0CC53849}" sibTransId="{7C782CE8-2909-4CFD-A879-3A849873620A}"/>
-    <dgm:cxn modelId="{37358E88-5F65-4377-975F-6818298FCDB8}" type="presOf" srcId="{380DAA67-6B41-4AF6-8416-9ABEC0C60697}" destId="{9E85ED12-C8A5-4775-862D-318BD48F56BE}" srcOrd="0" destOrd="0" presId="urn:microsoft.com/office/officeart/2005/8/layout/vList2"/>
-    <dgm:cxn modelId="{744F7689-E35E-4D7F-A2BC-1515CD3E87CF}" srcId="{76329A0F-D3C8-42EA-A61D-99904A3163C0}" destId="{4D48056A-6E41-4EAC-9860-82831A238C2E}" srcOrd="1" destOrd="0" parTransId="{3F137047-5492-4BF9-B315-0D4ED14A4B3D}" sibTransId="{9DB560BC-1067-4D41-974A-A01E4C886E90}"/>
+    <dgm:cxn modelId="{F8D37624-48E2-4C47-90C5-83C677DB88B1}" type="presOf" srcId="{D1CFB810-9C5F-440C-99E3-186A3FCD2520}" destId="{3BC9314E-C271-4FB6-A22B-E94E320B8031}" srcOrd="0" destOrd="0" presId="urn:microsoft.com/office/officeart/2005/8/layout/vList2"/>
+    <dgm:cxn modelId="{7756A9D3-A535-4B98-A38B-4A63F563C95F}" srcId="{76329A0F-D3C8-42EA-A61D-99904A3163C0}" destId="{6AC21D1C-265C-42AB-89B9-D0EE903902B8}" srcOrd="3" destOrd="0" parTransId="{0199E997-301F-498B-B35E-1B23F56F79F1}" sibTransId="{47AA88A2-13B2-4F4B-B0CD-C8BEC4EC14E8}"/>
     <dgm:cxn modelId="{D518F8A6-01EE-418B-94C0-AD622B78AEF7}" type="presOf" srcId="{BDF23FD8-8428-45E3-89BF-CC0DA00EB808}" destId="{3BC9314E-C271-4FB6-A22B-E94E320B8031}" srcOrd="0" destOrd="2" presId="urn:microsoft.com/office/officeart/2005/8/layout/vList2"/>
-    <dgm:cxn modelId="{7756A9D3-A535-4B98-A38B-4A63F563C95F}" srcId="{76329A0F-D3C8-42EA-A61D-99904A3163C0}" destId="{6AC21D1C-265C-42AB-89B9-D0EE903902B8}" srcOrd="3" destOrd="0" parTransId="{0199E997-301F-498B-B35E-1B23F56F79F1}" sibTransId="{47AA88A2-13B2-4F4B-B0CD-C8BEC4EC14E8}"/>
-    <dgm:cxn modelId="{B31745DC-D49D-481E-97C6-B704D61A5BF3}" srcId="{380DAA67-6B41-4AF6-8416-9ABEC0C60697}" destId="{CF1227AB-1362-47B4-A17A-45564FF0640C}" srcOrd="0" destOrd="0" parTransId="{58E6DE28-5086-4D2D-8730-D23C09091875}" sibTransId="{2EFC4030-1E33-416A-8386-4DA2D7A92E71}"/>
     <dgm:cxn modelId="{AA315ADC-7990-49FD-B53B-09F53CCA17D0}" type="presParOf" srcId="{4DD11236-98BF-4CFE-A2F6-1957A94EA9C5}" destId="{9E85ED12-C8A5-4775-862D-318BD48F56BE}" srcOrd="0" destOrd="0" presId="urn:microsoft.com/office/officeart/2005/8/layout/vList2"/>
     <dgm:cxn modelId="{3B2E0548-52DD-4C51-AF4E-7E08EEF4EFF5}" type="presParOf" srcId="{4DD11236-98BF-4CFE-A2F6-1957A94EA9C5}" destId="{289EDFF2-20AB-4CD1-8E03-85CBF8C22D47}" srcOrd="1" destOrd="0" presId="urn:microsoft.com/office/officeart/2005/8/layout/vList2"/>
     <dgm:cxn modelId="{B85398A4-D819-4DA0-A930-E08122AB6B32}" type="presParOf" srcId="{4DD11236-98BF-4CFE-A2F6-1957A94EA9C5}" destId="{FA433AF0-9DB1-4284-969E-82198B0D6E7C}" srcOrd="2" destOrd="0" presId="urn:microsoft.com/office/officeart/2005/8/layout/vList2"/>
@@ -3747,12 +3778,16 @@
         <a:lstStyle/>
         <a:p>
           <a:r>
-            <a:rPr lang="de-DE" sz="1600" dirty="0">
+            <a:rPr lang="de-DE" sz="1600" dirty="0" smtClean="0">
               <a:latin typeface="Calibri" panose="020F0502020204030204" pitchFamily="34" charset="0"/>
               <a:cs typeface="Calibri" panose="020F0502020204030204" pitchFamily="34" charset="0"/>
             </a:rPr>
             <a:t>Boolean an Server</a:t>
           </a:r>
+          <a:endParaRPr lang="de-DE" sz="1600" dirty="0">
+            <a:latin typeface="Calibri" panose="020F0502020204030204" pitchFamily="34" charset="0"/>
+            <a:cs typeface="Calibri" panose="020F0502020204030204" pitchFamily="34" charset="0"/>
+          </a:endParaRPr>
         </a:p>
       </dgm:t>
     </dgm:pt>
@@ -3797,6 +3832,13 @@
         </dgm:presLayoutVars>
       </dgm:prSet>
       <dgm:spPr/>
+      <dgm:t>
+        <a:bodyPr/>
+        <a:lstStyle/>
+        <a:p>
+          <a:endParaRPr lang="de-CH"/>
+        </a:p>
+      </dgm:t>
     </dgm:pt>
     <dgm:pt modelId="{4280EFFA-A061-4AC6-9B66-98E6FC92A2AA}" type="pres">
       <dgm:prSet presAssocID="{32A624AD-1E43-42D9-95D0-DD79079621CD}" presName="parTxOnlySpace" presStyleCnt="0"/>
@@ -3811,6 +3853,13 @@
         </dgm:presLayoutVars>
       </dgm:prSet>
       <dgm:spPr/>
+      <dgm:t>
+        <a:bodyPr/>
+        <a:lstStyle/>
+        <a:p>
+          <a:endParaRPr lang="de-CH"/>
+        </a:p>
+      </dgm:t>
     </dgm:pt>
     <dgm:pt modelId="{C4BDFEB1-6430-4430-ADBF-97DE088201B7}" type="pres">
       <dgm:prSet presAssocID="{E699881D-1636-4563-8E33-B4990A1930F2}" presName="parTxOnlySpace" presStyleCnt="0"/>
@@ -3825,16 +3874,23 @@
         </dgm:presLayoutVars>
       </dgm:prSet>
       <dgm:spPr/>
+      <dgm:t>
+        <a:bodyPr/>
+        <a:lstStyle/>
+        <a:p>
+          <a:endParaRPr lang="de-CH"/>
+        </a:p>
+      </dgm:t>
     </dgm:pt>
   </dgm:ptLst>
   <dgm:cxnLst>
-    <dgm:cxn modelId="{C6242B03-373F-4E6D-955B-CF4B3A7812E5}" type="presOf" srcId="{7AE4B5B6-0A53-49BE-8D4C-79F781E4BFEC}" destId="{640CD273-FB77-45DB-AF7C-637C367FA249}" srcOrd="0" destOrd="0" presId="urn:microsoft.com/office/officeart/2005/8/layout/chevron1"/>
-    <dgm:cxn modelId="{A0F3C121-852A-41CB-A8A5-BD16311DD824}" type="presOf" srcId="{81A83268-0277-4427-BBAD-1799636E4540}" destId="{EE785B4E-5198-431C-BBF7-E2778FCEC3FD}" srcOrd="0" destOrd="0" presId="urn:microsoft.com/office/officeart/2005/8/layout/chevron1"/>
-    <dgm:cxn modelId="{057E0761-715E-48D3-8217-B8D1511D33D8}" srcId="{163C54FC-2004-452E-AACE-2AFA12C1A0DE}" destId="{5B80A5CB-851F-4675-AEB8-BE555F65E512}" srcOrd="1" destOrd="0" parTransId="{5AA421B1-9795-43CC-9387-C240F099FC8E}" sibTransId="{E699881D-1636-4563-8E33-B4990A1930F2}"/>
     <dgm:cxn modelId="{E4BFE39C-E517-4D0A-948A-71DCF5EBBBA8}" type="presOf" srcId="{5B80A5CB-851F-4675-AEB8-BE555F65E512}" destId="{2031F8AD-0DB7-4133-B284-840DA44497C1}" srcOrd="0" destOrd="0" presId="urn:microsoft.com/office/officeart/2005/8/layout/chevron1"/>
     <dgm:cxn modelId="{DA2A0FB2-9486-44A9-89D0-7CEBBDC579F4}" srcId="{163C54FC-2004-452E-AACE-2AFA12C1A0DE}" destId="{7AE4B5B6-0A53-49BE-8D4C-79F781E4BFEC}" srcOrd="2" destOrd="0" parTransId="{BB871826-50A1-40A4-AB3C-F39FA960FA58}" sibTransId="{744A5731-480E-4DB9-8B40-C881A48B1FE2}"/>
+    <dgm:cxn modelId="{A0F3C121-852A-41CB-A8A5-BD16311DD824}" type="presOf" srcId="{81A83268-0277-4427-BBAD-1799636E4540}" destId="{EE785B4E-5198-431C-BBF7-E2778FCEC3FD}" srcOrd="0" destOrd="0" presId="urn:microsoft.com/office/officeart/2005/8/layout/chevron1"/>
+    <dgm:cxn modelId="{6A1913F6-290B-47C0-9CAF-F458AEF4088C}" type="presOf" srcId="{163C54FC-2004-452E-AACE-2AFA12C1A0DE}" destId="{A34E47EA-15B0-4F4E-A03C-FE05E2D420FE}" srcOrd="0" destOrd="0" presId="urn:microsoft.com/office/officeart/2005/8/layout/chevron1"/>
+    <dgm:cxn modelId="{C6242B03-373F-4E6D-955B-CF4B3A7812E5}" type="presOf" srcId="{7AE4B5B6-0A53-49BE-8D4C-79F781E4BFEC}" destId="{640CD273-FB77-45DB-AF7C-637C367FA249}" srcOrd="0" destOrd="0" presId="urn:microsoft.com/office/officeart/2005/8/layout/chevron1"/>
+    <dgm:cxn modelId="{057E0761-715E-48D3-8217-B8D1511D33D8}" srcId="{163C54FC-2004-452E-AACE-2AFA12C1A0DE}" destId="{5B80A5CB-851F-4675-AEB8-BE555F65E512}" srcOrd="1" destOrd="0" parTransId="{5AA421B1-9795-43CC-9387-C240F099FC8E}" sibTransId="{E699881D-1636-4563-8E33-B4990A1930F2}"/>
     <dgm:cxn modelId="{416349E4-5F8F-490C-9BB6-CA361BFCCAD7}" srcId="{163C54FC-2004-452E-AACE-2AFA12C1A0DE}" destId="{81A83268-0277-4427-BBAD-1799636E4540}" srcOrd="0" destOrd="0" parTransId="{5066F55F-F6EF-458F-8F66-C9D689061645}" sibTransId="{32A624AD-1E43-42D9-95D0-DD79079621CD}"/>
-    <dgm:cxn modelId="{6A1913F6-290B-47C0-9CAF-F458AEF4088C}" type="presOf" srcId="{163C54FC-2004-452E-AACE-2AFA12C1A0DE}" destId="{A34E47EA-15B0-4F4E-A03C-FE05E2D420FE}" srcOrd="0" destOrd="0" presId="urn:microsoft.com/office/officeart/2005/8/layout/chevron1"/>
     <dgm:cxn modelId="{3FB86B35-6C61-45E9-A15E-DA760ED5C5C5}" type="presParOf" srcId="{A34E47EA-15B0-4F4E-A03C-FE05E2D420FE}" destId="{EE785B4E-5198-431C-BBF7-E2778FCEC3FD}" srcOrd="0" destOrd="0" presId="urn:microsoft.com/office/officeart/2005/8/layout/chevron1"/>
     <dgm:cxn modelId="{40EDC0F8-4A00-41D3-B6A1-17814765BBF6}" type="presParOf" srcId="{A34E47EA-15B0-4F4E-A03C-FE05E2D420FE}" destId="{4280EFFA-A061-4AC6-9B66-98E6FC92A2AA}" srcOrd="1" destOrd="0" presId="urn:microsoft.com/office/officeart/2005/8/layout/chevron1"/>
     <dgm:cxn modelId="{617EDE1A-E4F5-49B6-BF8E-5C3D58B8019A}" type="presParOf" srcId="{A34E47EA-15B0-4F4E-A03C-FE05E2D420FE}" destId="{2031F8AD-0DB7-4133-B284-840DA44497C1}" srcOrd="2" destOrd="0" presId="urn:microsoft.com/office/officeart/2005/8/layout/chevron1"/>
@@ -4485,6 +4541,13 @@
         </dgm:presLayoutVars>
       </dgm:prSet>
       <dgm:spPr/>
+      <dgm:t>
+        <a:bodyPr/>
+        <a:lstStyle/>
+        <a:p>
+          <a:endParaRPr lang="de-CH"/>
+        </a:p>
+      </dgm:t>
     </dgm:pt>
     <dgm:pt modelId="{4134C65A-E796-4589-AD46-D362DB17F2BC}" type="pres">
       <dgm:prSet presAssocID="{C2263C80-6B39-4390-A426-5BB2D2C97D88}" presName="composite" presStyleCnt="0"/>
@@ -4499,6 +4562,13 @@
         </dgm:presLayoutVars>
       </dgm:prSet>
       <dgm:spPr/>
+      <dgm:t>
+        <a:bodyPr/>
+        <a:lstStyle/>
+        <a:p>
+          <a:endParaRPr lang="de-CH"/>
+        </a:p>
+      </dgm:t>
     </dgm:pt>
     <dgm:pt modelId="{81C14F67-E933-49AE-BC5C-B2B56264D657}" type="pres">
       <dgm:prSet presAssocID="{C2263C80-6B39-4390-A426-5BB2D2C97D88}" presName="desTx" presStyleLbl="alignAccFollowNode1" presStyleIdx="0" presStyleCnt="3" custLinFactNeighborX="-103" custLinFactNeighborY="5370">
@@ -4507,6 +4577,13 @@
         </dgm:presLayoutVars>
       </dgm:prSet>
       <dgm:spPr/>
+      <dgm:t>
+        <a:bodyPr/>
+        <a:lstStyle/>
+        <a:p>
+          <a:endParaRPr lang="de-CH"/>
+        </a:p>
+      </dgm:t>
     </dgm:pt>
     <dgm:pt modelId="{3B5950AA-59AA-4EE4-918E-7551DD219A3C}" type="pres">
       <dgm:prSet presAssocID="{06010DAA-E52E-4197-9CB1-1FF111DE3381}" presName="space" presStyleCnt="0"/>
@@ -4525,6 +4602,13 @@
         </dgm:presLayoutVars>
       </dgm:prSet>
       <dgm:spPr/>
+      <dgm:t>
+        <a:bodyPr/>
+        <a:lstStyle/>
+        <a:p>
+          <a:endParaRPr lang="de-CH"/>
+        </a:p>
+      </dgm:t>
     </dgm:pt>
     <dgm:pt modelId="{EC299A1D-5E47-48A4-B988-31D2B7355915}" type="pres">
       <dgm:prSet presAssocID="{32567ED3-AF77-482E-BED1-867AB9B8BA42}" presName="desTx" presStyleLbl="alignAccFollowNode1" presStyleIdx="1" presStyleCnt="3" custLinFactNeighborX="20" custLinFactNeighborY="5370">
@@ -4533,6 +4617,13 @@
         </dgm:presLayoutVars>
       </dgm:prSet>
       <dgm:spPr/>
+      <dgm:t>
+        <a:bodyPr/>
+        <a:lstStyle/>
+        <a:p>
+          <a:endParaRPr lang="de-CH"/>
+        </a:p>
+      </dgm:t>
     </dgm:pt>
     <dgm:pt modelId="{748352D6-9DA5-4C5A-B82A-A01CE473C37E}" type="pres">
       <dgm:prSet presAssocID="{50890DAE-0950-446F-9208-666AB98ECCF6}" presName="space" presStyleCnt="0"/>
@@ -4551,6 +4642,13 @@
         </dgm:presLayoutVars>
       </dgm:prSet>
       <dgm:spPr/>
+      <dgm:t>
+        <a:bodyPr/>
+        <a:lstStyle/>
+        <a:p>
+          <a:endParaRPr lang="de-CH"/>
+        </a:p>
+      </dgm:t>
     </dgm:pt>
     <dgm:pt modelId="{19EAB99B-3F3C-4C08-9787-48351BC7F651}" type="pres">
       <dgm:prSet presAssocID="{D2DD5270-FA56-4206-A038-A4A03737E170}" presName="desTx" presStyleLbl="alignAccFollowNode1" presStyleIdx="2" presStyleCnt="3" custLinFactNeighborX="103" custLinFactNeighborY="5370">
@@ -4559,38 +4657,45 @@
         </dgm:presLayoutVars>
       </dgm:prSet>
       <dgm:spPr/>
+      <dgm:t>
+        <a:bodyPr/>
+        <a:lstStyle/>
+        <a:p>
+          <a:endParaRPr lang="de-CH"/>
+        </a:p>
+      </dgm:t>
     </dgm:pt>
   </dgm:ptLst>
   <dgm:cxnLst>
+    <dgm:cxn modelId="{E8F8D5D7-D512-4C00-8EA7-8E1443D4630E}" srcId="{C2263C80-6B39-4390-A426-5BB2D2C97D88}" destId="{3963C2DF-DA24-45B1-9705-8CD206DF65B3}" srcOrd="0" destOrd="0" parTransId="{00B1AE7C-55D4-42D7-8800-F11197DF668B}" sibTransId="{F9A172D8-B130-4FC5-8D1E-E6C0C6D4FB16}"/>
+    <dgm:cxn modelId="{56A754BF-C9B2-4FD3-A51D-E106C61DE787}" srcId="{25601DF5-F830-41F9-9ACA-2AA909590390}" destId="{C2263C80-6B39-4390-A426-5BB2D2C97D88}" srcOrd="0" destOrd="0" parTransId="{677F90B3-7C7F-429B-9984-64033CCA83C0}" sibTransId="{06010DAA-E52E-4197-9CB1-1FF111DE3381}"/>
+    <dgm:cxn modelId="{3823EF93-7FBF-41F4-8D4B-36534F246966}" srcId="{32567ED3-AF77-482E-BED1-867AB9B8BA42}" destId="{68FB74EF-7CB4-43FB-9803-E17DDAD92025}" srcOrd="1" destOrd="0" parTransId="{BB8FD4E3-CE49-42FC-90C6-D7FAFC3CAA36}" sibTransId="{0962D98C-C3F1-4402-A15E-2802432C6928}"/>
+    <dgm:cxn modelId="{9EB17C4F-C9A2-4CDA-BB63-E285F566DB8D}" type="presOf" srcId="{32567ED3-AF77-482E-BED1-867AB9B8BA42}" destId="{82754283-C103-4F4B-949A-ED587806CE44}" srcOrd="0" destOrd="0" presId="urn:microsoft.com/office/officeart/2005/8/layout/hList1"/>
+    <dgm:cxn modelId="{63F2C0D9-7607-4E9C-8F81-9B4BCA88261E}" type="presOf" srcId="{01B12913-EDCF-4E90-9548-89322ED78AAC}" destId="{81C14F67-E933-49AE-BC5C-B2B56264D657}" srcOrd="0" destOrd="2" presId="urn:microsoft.com/office/officeart/2005/8/layout/hList1"/>
     <dgm:cxn modelId="{A4FF4000-2F0C-4671-81A3-FFA87B8E3930}" type="presOf" srcId="{C2263C80-6B39-4390-A426-5BB2D2C97D88}" destId="{4A74C392-6404-4941-88D5-1E4B139ACF03}" srcOrd="0" destOrd="0" presId="urn:microsoft.com/office/officeart/2005/8/layout/hList1"/>
-    <dgm:cxn modelId="{4BB09513-B182-49A5-96B7-21BF1ABAA00D}" srcId="{32567ED3-AF77-482E-BED1-867AB9B8BA42}" destId="{3927C055-55AE-4E40-A8D4-84CBE89BCC39}" srcOrd="0" destOrd="0" parTransId="{58A5F3E3-0E65-4C74-8A97-FDEDC821967A}" sibTransId="{E2DBF498-547F-4628-9632-FF1B47064A76}"/>
+    <dgm:cxn modelId="{05B71F9C-C65F-458B-9172-D07AACD4339D}" type="presOf" srcId="{D8B808BA-E0D6-4298-A936-20FE406D9647}" destId="{EC299A1D-5E47-48A4-B988-31D2B7355915}" srcOrd="0" destOrd="2" presId="urn:microsoft.com/office/officeart/2005/8/layout/hList1"/>
+    <dgm:cxn modelId="{942B7CF3-CEF7-4570-9838-B9FFBD199464}" srcId="{25601DF5-F830-41F9-9ACA-2AA909590390}" destId="{32567ED3-AF77-482E-BED1-867AB9B8BA42}" srcOrd="1" destOrd="0" parTransId="{90B5C6E2-A4E7-4654-9CF5-3DEE8E71E031}" sibTransId="{50890DAE-0950-446F-9208-666AB98ECCF6}"/>
+    <dgm:cxn modelId="{084D07AD-6604-4B27-9895-AC584F424547}" srcId="{C2263C80-6B39-4390-A426-5BB2D2C97D88}" destId="{4F615E92-41CC-4EDF-B72B-D43E86777F42}" srcOrd="1" destOrd="0" parTransId="{FB4F69AC-85E5-42FF-A19A-AA124E74068E}" sibTransId="{000030C0-18C2-4FE1-B258-A2B84395AF06}"/>
+    <dgm:cxn modelId="{8212FAED-0536-4955-A03A-BBECD68864CE}" srcId="{D2DD5270-FA56-4206-A038-A4A03737E170}" destId="{A63B8ECE-8416-4248-8F69-9E9571E02C16}" srcOrd="1" destOrd="0" parTransId="{7A2614EF-4798-417C-9C19-6657644A2728}" sibTransId="{73BF8C3C-9534-41D1-840D-EEB2EC06AC0B}"/>
+    <dgm:cxn modelId="{1E3B39DC-DF88-4C0D-A6C1-769460C7FC5C}" srcId="{25601DF5-F830-41F9-9ACA-2AA909590390}" destId="{D2DD5270-FA56-4206-A038-A4A03737E170}" srcOrd="2" destOrd="0" parTransId="{A54E3E2A-B9AF-4A9F-B0A9-3B9A5BB7473C}" sibTransId="{6426822D-E67E-4658-97A3-73C710EFD191}"/>
+    <dgm:cxn modelId="{36EEDD9A-74B3-47F2-A1A8-E4330CF5D3C6}" type="presOf" srcId="{A63B8ECE-8416-4248-8F69-9E9571E02C16}" destId="{19EAB99B-3F3C-4C08-9787-48351BC7F651}" srcOrd="0" destOrd="1" presId="urn:microsoft.com/office/officeart/2005/8/layout/hList1"/>
+    <dgm:cxn modelId="{030446FF-8E02-494D-B714-58A4DA80D8BB}" type="presOf" srcId="{25601DF5-F830-41F9-9ACA-2AA909590390}" destId="{B6776644-950A-4D54-87D2-0A223644CD04}" srcOrd="0" destOrd="0" presId="urn:microsoft.com/office/officeart/2005/8/layout/hList1"/>
+    <dgm:cxn modelId="{237BD291-B93B-4AD5-A07F-CED237479EEE}" srcId="{C2263C80-6B39-4390-A426-5BB2D2C97D88}" destId="{0A8C4F56-3F13-4016-B8D4-B4C0D2E10464}" srcOrd="3" destOrd="0" parTransId="{5CB9CE90-895E-4F77-BF73-8ED3F8191D68}" sibTransId="{607DD266-8A5D-4A55-85B9-63EE6D1DE4C3}"/>
+    <dgm:cxn modelId="{7C51E6F9-ED8D-41F6-A398-E54BF048C1CF}" type="presOf" srcId="{3963C2DF-DA24-45B1-9705-8CD206DF65B3}" destId="{81C14F67-E933-49AE-BC5C-B2B56264D657}" srcOrd="0" destOrd="0" presId="urn:microsoft.com/office/officeart/2005/8/layout/hList1"/>
+    <dgm:cxn modelId="{3B537766-D9E6-49AC-981B-3AE765199C7F}" srcId="{32567ED3-AF77-482E-BED1-867AB9B8BA42}" destId="{D8B808BA-E0D6-4298-A936-20FE406D9647}" srcOrd="2" destOrd="0" parTransId="{D4802F10-5897-4ACB-A356-C96FCA37FFFA}" sibTransId="{69930E38-DA3C-460B-BE74-290A2197CBA6}"/>
+    <dgm:cxn modelId="{D45F9B92-0974-44D3-B0C9-1AC2DF59BE6B}" type="presOf" srcId="{E4508541-F78B-4CC5-9872-341C4D98EA7F}" destId="{81C14F67-E933-49AE-BC5C-B2B56264D657}" srcOrd="0" destOrd="4" presId="urn:microsoft.com/office/officeart/2005/8/layout/hList1"/>
+    <dgm:cxn modelId="{2C8CBE72-B360-4827-BE20-C2A5F4F225FA}" type="presOf" srcId="{68FB74EF-7CB4-43FB-9803-E17DDAD92025}" destId="{EC299A1D-5E47-48A4-B988-31D2B7355915}" srcOrd="0" destOrd="1" presId="urn:microsoft.com/office/officeart/2005/8/layout/hList1"/>
+    <dgm:cxn modelId="{96FF7360-7474-486A-B836-D44EEED2A169}" type="presOf" srcId="{4F615E92-41CC-4EDF-B72B-D43E86777F42}" destId="{81C14F67-E933-49AE-BC5C-B2B56264D657}" srcOrd="0" destOrd="1" presId="urn:microsoft.com/office/officeart/2005/8/layout/hList1"/>
     <dgm:cxn modelId="{0E6B861B-6D46-4BF5-B3EF-6C5ABEBEA141}" srcId="{D2DD5270-FA56-4206-A038-A4A03737E170}" destId="{D1D5F571-25D9-49E1-AAA2-1F2320985DE4}" srcOrd="0" destOrd="0" parTransId="{4B894F84-BAA7-4505-840C-D11D75EFDD83}" sibTransId="{E89457F8-12E1-4891-9543-808EE6E0719D}"/>
-    <dgm:cxn modelId="{738B9132-0372-4E17-993C-1A38D7EFE000}" type="presOf" srcId="{D2DD5270-FA56-4206-A038-A4A03737E170}" destId="{0CC623B2-3A59-4916-AEC2-21E47CA2B7D6}" srcOrd="0" destOrd="0" presId="urn:microsoft.com/office/officeart/2005/8/layout/hList1"/>
-    <dgm:cxn modelId="{96FF7360-7474-486A-B836-D44EEED2A169}" type="presOf" srcId="{4F615E92-41CC-4EDF-B72B-D43E86777F42}" destId="{81C14F67-E933-49AE-BC5C-B2B56264D657}" srcOrd="0" destOrd="1" presId="urn:microsoft.com/office/officeart/2005/8/layout/hList1"/>
-    <dgm:cxn modelId="{3B537766-D9E6-49AC-981B-3AE765199C7F}" srcId="{32567ED3-AF77-482E-BED1-867AB9B8BA42}" destId="{D8B808BA-E0D6-4298-A936-20FE406D9647}" srcOrd="2" destOrd="0" parTransId="{D4802F10-5897-4ACB-A356-C96FCA37FFFA}" sibTransId="{69930E38-DA3C-460B-BE74-290A2197CBA6}"/>
+    <dgm:cxn modelId="{07706A9A-2CCB-43C2-9729-FBB9BECB4327}" type="presOf" srcId="{0A8C4F56-3F13-4016-B8D4-B4C0D2E10464}" destId="{81C14F67-E933-49AE-BC5C-B2B56264D657}" srcOrd="0" destOrd="3" presId="urn:microsoft.com/office/officeart/2005/8/layout/hList1"/>
+    <dgm:cxn modelId="{0A88C5DE-E59C-487D-8534-55009196AEF9}" type="presOf" srcId="{D1D5F571-25D9-49E1-AAA2-1F2320985DE4}" destId="{19EAB99B-3F3C-4C08-9787-48351BC7F651}" srcOrd="0" destOrd="0" presId="urn:microsoft.com/office/officeart/2005/8/layout/hList1"/>
+    <dgm:cxn modelId="{79B1B6BB-6371-4CB4-9BD9-E202235B35EA}" type="presOf" srcId="{3927C055-55AE-4E40-A8D4-84CBE89BCC39}" destId="{EC299A1D-5E47-48A4-B988-31D2B7355915}" srcOrd="0" destOrd="0" presId="urn:microsoft.com/office/officeart/2005/8/layout/hList1"/>
     <dgm:cxn modelId="{B8073F67-52DF-469C-82D3-70E242F46EC2}" srcId="{C2263C80-6B39-4390-A426-5BB2D2C97D88}" destId="{E4508541-F78B-4CC5-9872-341C4D98EA7F}" srcOrd="4" destOrd="0" parTransId="{A020A451-80A6-475C-9CF5-A45BAEEE54B9}" sibTransId="{DCDB1A9A-91CA-419A-BF70-5E8EE88D349A}"/>
-    <dgm:cxn modelId="{9EB17C4F-C9A2-4CDA-BB63-E285F566DB8D}" type="presOf" srcId="{32567ED3-AF77-482E-BED1-867AB9B8BA42}" destId="{82754283-C103-4F4B-949A-ED587806CE44}" srcOrd="0" destOrd="0" presId="urn:microsoft.com/office/officeart/2005/8/layout/hList1"/>
-    <dgm:cxn modelId="{96D8AE51-1EB7-4F57-AE35-51E42F949DB8}" srcId="{32567ED3-AF77-482E-BED1-867AB9B8BA42}" destId="{D1AC3DEC-17B2-4107-B4D0-760ED18F2CBA}" srcOrd="3" destOrd="0" parTransId="{A3A84CEA-FDF5-40EF-A5DC-23A6C160031A}" sibTransId="{51E7FB18-19D3-4825-B0A0-BC89ADA8B683}"/>
-    <dgm:cxn modelId="{2C8CBE72-B360-4827-BE20-C2A5F4F225FA}" type="presOf" srcId="{68FB74EF-7CB4-43FB-9803-E17DDAD92025}" destId="{EC299A1D-5E47-48A4-B988-31D2B7355915}" srcOrd="0" destOrd="1" presId="urn:microsoft.com/office/officeart/2005/8/layout/hList1"/>
     <dgm:cxn modelId="{CA99D487-D404-4FCD-A192-B1DFDAB2D8EC}" srcId="{C2263C80-6B39-4390-A426-5BB2D2C97D88}" destId="{01B12913-EDCF-4E90-9548-89322ED78AAC}" srcOrd="2" destOrd="0" parTransId="{AB86CD56-E812-40A2-B9FC-84327153E734}" sibTransId="{DA8F2451-D2EF-4F2B-A6B1-06204FDF200F}"/>
     <dgm:cxn modelId="{CE152A8C-1D55-4660-A0EF-252161CE2743}" type="presOf" srcId="{D1AC3DEC-17B2-4107-B4D0-760ED18F2CBA}" destId="{EC299A1D-5E47-48A4-B988-31D2B7355915}" srcOrd="0" destOrd="3" presId="urn:microsoft.com/office/officeart/2005/8/layout/hList1"/>
-    <dgm:cxn modelId="{237BD291-B93B-4AD5-A07F-CED237479EEE}" srcId="{C2263C80-6B39-4390-A426-5BB2D2C97D88}" destId="{0A8C4F56-3F13-4016-B8D4-B4C0D2E10464}" srcOrd="3" destOrd="0" parTransId="{5CB9CE90-895E-4F77-BF73-8ED3F8191D68}" sibTransId="{607DD266-8A5D-4A55-85B9-63EE6D1DE4C3}"/>
-    <dgm:cxn modelId="{D45F9B92-0974-44D3-B0C9-1AC2DF59BE6B}" type="presOf" srcId="{E4508541-F78B-4CC5-9872-341C4D98EA7F}" destId="{81C14F67-E933-49AE-BC5C-B2B56264D657}" srcOrd="0" destOrd="4" presId="urn:microsoft.com/office/officeart/2005/8/layout/hList1"/>
-    <dgm:cxn modelId="{3823EF93-7FBF-41F4-8D4B-36534F246966}" srcId="{32567ED3-AF77-482E-BED1-867AB9B8BA42}" destId="{68FB74EF-7CB4-43FB-9803-E17DDAD92025}" srcOrd="1" destOrd="0" parTransId="{BB8FD4E3-CE49-42FC-90C6-D7FAFC3CAA36}" sibTransId="{0962D98C-C3F1-4402-A15E-2802432C6928}"/>
-    <dgm:cxn modelId="{07706A9A-2CCB-43C2-9729-FBB9BECB4327}" type="presOf" srcId="{0A8C4F56-3F13-4016-B8D4-B4C0D2E10464}" destId="{81C14F67-E933-49AE-BC5C-B2B56264D657}" srcOrd="0" destOrd="3" presId="urn:microsoft.com/office/officeart/2005/8/layout/hList1"/>
-    <dgm:cxn modelId="{36EEDD9A-74B3-47F2-A1A8-E4330CF5D3C6}" type="presOf" srcId="{A63B8ECE-8416-4248-8F69-9E9571E02C16}" destId="{19EAB99B-3F3C-4C08-9787-48351BC7F651}" srcOrd="0" destOrd="1" presId="urn:microsoft.com/office/officeart/2005/8/layout/hList1"/>
-    <dgm:cxn modelId="{05B71F9C-C65F-458B-9172-D07AACD4339D}" type="presOf" srcId="{D8B808BA-E0D6-4298-A936-20FE406D9647}" destId="{EC299A1D-5E47-48A4-B988-31D2B7355915}" srcOrd="0" destOrd="2" presId="urn:microsoft.com/office/officeart/2005/8/layout/hList1"/>
-    <dgm:cxn modelId="{084D07AD-6604-4B27-9895-AC584F424547}" srcId="{C2263C80-6B39-4390-A426-5BB2D2C97D88}" destId="{4F615E92-41CC-4EDF-B72B-D43E86777F42}" srcOrd="1" destOrd="0" parTransId="{FB4F69AC-85E5-42FF-A19A-AA124E74068E}" sibTransId="{000030C0-18C2-4FE1-B258-A2B84395AF06}"/>
-    <dgm:cxn modelId="{79B1B6BB-6371-4CB4-9BD9-E202235B35EA}" type="presOf" srcId="{3927C055-55AE-4E40-A8D4-84CBE89BCC39}" destId="{EC299A1D-5E47-48A4-B988-31D2B7355915}" srcOrd="0" destOrd="0" presId="urn:microsoft.com/office/officeart/2005/8/layout/hList1"/>
-    <dgm:cxn modelId="{56A754BF-C9B2-4FD3-A51D-E106C61DE787}" srcId="{25601DF5-F830-41F9-9ACA-2AA909590390}" destId="{C2263C80-6B39-4390-A426-5BB2D2C97D88}" srcOrd="0" destOrd="0" parTransId="{677F90B3-7C7F-429B-9984-64033CCA83C0}" sibTransId="{06010DAA-E52E-4197-9CB1-1FF111DE3381}"/>
-    <dgm:cxn modelId="{E8F8D5D7-D512-4C00-8EA7-8E1443D4630E}" srcId="{C2263C80-6B39-4390-A426-5BB2D2C97D88}" destId="{3963C2DF-DA24-45B1-9705-8CD206DF65B3}" srcOrd="0" destOrd="0" parTransId="{00B1AE7C-55D4-42D7-8800-F11197DF668B}" sibTransId="{F9A172D8-B130-4FC5-8D1E-E6C0C6D4FB16}"/>
-    <dgm:cxn modelId="{63F2C0D9-7607-4E9C-8F81-9B4BCA88261E}" type="presOf" srcId="{01B12913-EDCF-4E90-9548-89322ED78AAC}" destId="{81C14F67-E933-49AE-BC5C-B2B56264D657}" srcOrd="0" destOrd="2" presId="urn:microsoft.com/office/officeart/2005/8/layout/hList1"/>
-    <dgm:cxn modelId="{1E3B39DC-DF88-4C0D-A6C1-769460C7FC5C}" srcId="{25601DF5-F830-41F9-9ACA-2AA909590390}" destId="{D2DD5270-FA56-4206-A038-A4A03737E170}" srcOrd="2" destOrd="0" parTransId="{A54E3E2A-B9AF-4A9F-B0A9-3B9A5BB7473C}" sibTransId="{6426822D-E67E-4658-97A3-73C710EFD191}"/>
-    <dgm:cxn modelId="{0A88C5DE-E59C-487D-8534-55009196AEF9}" type="presOf" srcId="{D1D5F571-25D9-49E1-AAA2-1F2320985DE4}" destId="{19EAB99B-3F3C-4C08-9787-48351BC7F651}" srcOrd="0" destOrd="0" presId="urn:microsoft.com/office/officeart/2005/8/layout/hList1"/>
-    <dgm:cxn modelId="{8212FAED-0536-4955-A03A-BBECD68864CE}" srcId="{D2DD5270-FA56-4206-A038-A4A03737E170}" destId="{A63B8ECE-8416-4248-8F69-9E9571E02C16}" srcOrd="1" destOrd="0" parTransId="{7A2614EF-4798-417C-9C19-6657644A2728}" sibTransId="{73BF8C3C-9534-41D1-840D-EEB2EC06AC0B}"/>
-    <dgm:cxn modelId="{942B7CF3-CEF7-4570-9838-B9FFBD199464}" srcId="{25601DF5-F830-41F9-9ACA-2AA909590390}" destId="{32567ED3-AF77-482E-BED1-867AB9B8BA42}" srcOrd="1" destOrd="0" parTransId="{90B5C6E2-A4E7-4654-9CF5-3DEE8E71E031}" sibTransId="{50890DAE-0950-446F-9208-666AB98ECCF6}"/>
-    <dgm:cxn modelId="{7C51E6F9-ED8D-41F6-A398-E54BF048C1CF}" type="presOf" srcId="{3963C2DF-DA24-45B1-9705-8CD206DF65B3}" destId="{81C14F67-E933-49AE-BC5C-B2B56264D657}" srcOrd="0" destOrd="0" presId="urn:microsoft.com/office/officeart/2005/8/layout/hList1"/>
-    <dgm:cxn modelId="{030446FF-8E02-494D-B714-58A4DA80D8BB}" type="presOf" srcId="{25601DF5-F830-41F9-9ACA-2AA909590390}" destId="{B6776644-950A-4D54-87D2-0A223644CD04}" srcOrd="0" destOrd="0" presId="urn:microsoft.com/office/officeart/2005/8/layout/hList1"/>
+    <dgm:cxn modelId="{4BB09513-B182-49A5-96B7-21BF1ABAA00D}" srcId="{32567ED3-AF77-482E-BED1-867AB9B8BA42}" destId="{3927C055-55AE-4E40-A8D4-84CBE89BCC39}" srcOrd="0" destOrd="0" parTransId="{58A5F3E3-0E65-4C74-8A97-FDEDC821967A}" sibTransId="{E2DBF498-547F-4628-9632-FF1B47064A76}"/>
+    <dgm:cxn modelId="{738B9132-0372-4E17-993C-1A38D7EFE000}" type="presOf" srcId="{D2DD5270-FA56-4206-A038-A4A03737E170}" destId="{0CC623B2-3A59-4916-AEC2-21E47CA2B7D6}" srcOrd="0" destOrd="0" presId="urn:microsoft.com/office/officeart/2005/8/layout/hList1"/>
+    <dgm:cxn modelId="{96D8AE51-1EB7-4F57-AE35-51E42F949DB8}" srcId="{32567ED3-AF77-482E-BED1-867AB9B8BA42}" destId="{D1AC3DEC-17B2-4107-B4D0-760ED18F2CBA}" srcOrd="3" destOrd="0" parTransId="{A3A84CEA-FDF5-40EF-A5DC-23A6C160031A}" sibTransId="{51E7FB18-19D3-4825-B0A0-BC89ADA8B683}"/>
     <dgm:cxn modelId="{F1F64D3B-37F7-4CBC-859F-7F482F31A20B}" type="presParOf" srcId="{B6776644-950A-4D54-87D2-0A223644CD04}" destId="{4134C65A-E796-4589-AD46-D362DB17F2BC}" srcOrd="0" destOrd="0" presId="urn:microsoft.com/office/officeart/2005/8/layout/hList1"/>
     <dgm:cxn modelId="{D421B2BD-4C3F-4407-A1C8-7679A6F35499}" type="presParOf" srcId="{4134C65A-E796-4589-AD46-D362DB17F2BC}" destId="{4A74C392-6404-4941-88D5-1E4B139ACF03}" srcOrd="0" destOrd="0" presId="urn:microsoft.com/office/officeart/2005/8/layout/hList1"/>
     <dgm:cxn modelId="{8DE70CDD-B9F2-44A7-ADCD-F5DFF6AF9B53}" type="presParOf" srcId="{4134C65A-E796-4589-AD46-D362DB17F2BC}" destId="{81C14F67-E933-49AE-BC5C-B2B56264D657}" srcOrd="1" destOrd="0" presId="urn:microsoft.com/office/officeart/2005/8/layout/hList1"/>
@@ -5042,6 +5147,13 @@
         </dgm:presLayoutVars>
       </dgm:prSet>
       <dgm:spPr/>
+      <dgm:t>
+        <a:bodyPr/>
+        <a:lstStyle/>
+        <a:p>
+          <a:endParaRPr lang="de-CH"/>
+        </a:p>
+      </dgm:t>
     </dgm:pt>
     <dgm:pt modelId="{56C188AC-E08A-4FA7-B593-5923AE52E53B}" type="pres">
       <dgm:prSet presAssocID="{9E8763A7-0DA5-4F1A-A006-6721BBBDF474}" presName="node" presStyleLbl="node1" presStyleIdx="0" presStyleCnt="6" custScaleY="84232" custLinFactNeighborY="-11225">
@@ -5050,6 +5162,13 @@
         </dgm:presLayoutVars>
       </dgm:prSet>
       <dgm:spPr/>
+      <dgm:t>
+        <a:bodyPr/>
+        <a:lstStyle/>
+        <a:p>
+          <a:endParaRPr lang="de-CH"/>
+        </a:p>
+      </dgm:t>
     </dgm:pt>
     <dgm:pt modelId="{C11C458F-1DF9-45A1-B451-F9D5CC86DCC6}" type="pres">
       <dgm:prSet presAssocID="{0D291144-9BC4-4D56-913F-C54ACBA9DD55}" presName="sibTrans" presStyleCnt="0"/>
@@ -5062,6 +5181,13 @@
         </dgm:presLayoutVars>
       </dgm:prSet>
       <dgm:spPr/>
+      <dgm:t>
+        <a:bodyPr/>
+        <a:lstStyle/>
+        <a:p>
+          <a:endParaRPr lang="de-CH"/>
+        </a:p>
+      </dgm:t>
     </dgm:pt>
     <dgm:pt modelId="{7C1740F0-57AB-46E4-A354-8B9E192475A5}" type="pres">
       <dgm:prSet presAssocID="{3BF18C67-2962-4A3B-BC3F-463CD99A55F4}" presName="sibTrans" presStyleCnt="0"/>
@@ -5074,6 +5200,13 @@
         </dgm:presLayoutVars>
       </dgm:prSet>
       <dgm:spPr/>
+      <dgm:t>
+        <a:bodyPr/>
+        <a:lstStyle/>
+        <a:p>
+          <a:endParaRPr lang="de-CH"/>
+        </a:p>
+      </dgm:t>
     </dgm:pt>
     <dgm:pt modelId="{C44555EE-72D0-4E7B-9FCF-A5CE173A3D61}" type="pres">
       <dgm:prSet presAssocID="{616933E6-AD4C-4F22-86E2-A4F89A564831}" presName="sibTrans" presStyleCnt="0"/>
@@ -5086,6 +5219,13 @@
         </dgm:presLayoutVars>
       </dgm:prSet>
       <dgm:spPr/>
+      <dgm:t>
+        <a:bodyPr/>
+        <a:lstStyle/>
+        <a:p>
+          <a:endParaRPr lang="de-CH"/>
+        </a:p>
+      </dgm:t>
     </dgm:pt>
     <dgm:pt modelId="{33C96B14-45A2-4A35-91EF-417DBF722827}" type="pres">
       <dgm:prSet presAssocID="{4D6B4C43-6198-4547-A8A5-0DA87F13E502}" presName="sibTrans" presStyleCnt="0"/>
@@ -5098,6 +5238,13 @@
         </dgm:presLayoutVars>
       </dgm:prSet>
       <dgm:spPr/>
+      <dgm:t>
+        <a:bodyPr/>
+        <a:lstStyle/>
+        <a:p>
+          <a:endParaRPr lang="de-CH"/>
+        </a:p>
+      </dgm:t>
     </dgm:pt>
     <dgm:pt modelId="{6BE936CA-7F1C-47A4-BB09-CF5D786126A1}" type="pres">
       <dgm:prSet presAssocID="{47D42404-83CD-43B3-958A-3E938CAAFD92}" presName="sibTrans" presStyleCnt="0"/>
@@ -5110,22 +5257,29 @@
         </dgm:presLayoutVars>
       </dgm:prSet>
       <dgm:spPr/>
+      <dgm:t>
+        <a:bodyPr/>
+        <a:lstStyle/>
+        <a:p>
+          <a:endParaRPr lang="de-CH"/>
+        </a:p>
+      </dgm:t>
     </dgm:pt>
   </dgm:ptLst>
   <dgm:cxnLst>
-    <dgm:cxn modelId="{630B1A05-B8FE-4FD3-9FBE-22B7DC24C356}" type="presOf" srcId="{4842BE4D-C5D1-4DE1-B196-985D4950C43C}" destId="{FED4C30F-0D25-4E55-930C-B6331A8324B6}" srcOrd="0" destOrd="0" presId="urn:microsoft.com/office/officeart/2005/8/layout/default"/>
-    <dgm:cxn modelId="{CD033F0C-B554-4D4C-A719-ABE425C16B4D}" type="presOf" srcId="{9E8763A7-0DA5-4F1A-A006-6721BBBDF474}" destId="{56C188AC-E08A-4FA7-B593-5923AE52E53B}" srcOrd="0" destOrd="0" presId="urn:microsoft.com/office/officeart/2005/8/layout/default"/>
-    <dgm:cxn modelId="{35D17342-4735-4AF4-8E1C-B1DD1C3762BF}" type="presOf" srcId="{5AF6C592-FBD5-4B44-8411-A822379C5408}" destId="{FC0754D9-D3C9-438C-A529-98BC696D00E4}" srcOrd="0" destOrd="0" presId="urn:microsoft.com/office/officeart/2005/8/layout/default"/>
-    <dgm:cxn modelId="{DB9B4F63-4844-4A52-A5B3-8661969F15C1}" srcId="{9751AA1E-9926-4921-95AB-98F55E6D516A}" destId="{4842BE4D-C5D1-4DE1-B196-985D4950C43C}" srcOrd="1" destOrd="0" parTransId="{793F28E0-818C-4FED-A4C6-8BD134AA6D50}" sibTransId="{3BF18C67-2962-4A3B-BC3F-463CD99A55F4}"/>
-    <dgm:cxn modelId="{5E21D17F-A8F6-437E-85EC-56F433400FDB}" type="presOf" srcId="{9751AA1E-9926-4921-95AB-98F55E6D516A}" destId="{34A8BDE5-A877-4888-96D2-655FB1291EED}" srcOrd="0" destOrd="0" presId="urn:microsoft.com/office/officeart/2005/8/layout/default"/>
+    <dgm:cxn modelId="{B74EB7E5-9625-472B-A55E-FC94AC7353CC}" srcId="{9751AA1E-9926-4921-95AB-98F55E6D516A}" destId="{58A4CE31-89D7-4960-B794-FCC931506AE8}" srcOrd="2" destOrd="0" parTransId="{98A1511F-D762-4B72-9121-615FD27A10EB}" sibTransId="{616933E6-AD4C-4F22-86E2-A4F89A564831}"/>
+    <dgm:cxn modelId="{6A0345CC-E31B-453E-9BAC-50FE142EFDEC}" srcId="{9751AA1E-9926-4921-95AB-98F55E6D516A}" destId="{ED1F7831-1E81-44FA-BADA-B89C74D4EAD2}" srcOrd="5" destOrd="0" parTransId="{6A2F0721-235D-4AF8-816F-DEE9CF052B83}" sibTransId="{276F4ED2-6322-412E-9680-02602359B5FB}"/>
     <dgm:cxn modelId="{8C7D7580-89AB-4776-94A5-3EB0F6C524D2}" type="presOf" srcId="{58A4CE31-89D7-4960-B794-FCC931506AE8}" destId="{272EA94F-EDA9-496F-A6E9-D3A726C951DD}" srcOrd="0" destOrd="0" presId="urn:microsoft.com/office/officeart/2005/8/layout/default"/>
     <dgm:cxn modelId="{F4875989-98D2-4774-88ED-6B72D0F16A53}" type="presOf" srcId="{ED1F7831-1E81-44FA-BADA-B89C74D4EAD2}" destId="{708AE0BE-5172-49FF-B850-99FBE2F851B9}" srcOrd="0" destOrd="0" presId="urn:microsoft.com/office/officeart/2005/8/layout/default"/>
+    <dgm:cxn modelId="{DB9B4F63-4844-4A52-A5B3-8661969F15C1}" srcId="{9751AA1E-9926-4921-95AB-98F55E6D516A}" destId="{4842BE4D-C5D1-4DE1-B196-985D4950C43C}" srcOrd="1" destOrd="0" parTransId="{793F28E0-818C-4FED-A4C6-8BD134AA6D50}" sibTransId="{3BF18C67-2962-4A3B-BC3F-463CD99A55F4}"/>
+    <dgm:cxn modelId="{875BD3D2-E407-4F85-853E-4D42A070BC4A}" srcId="{9751AA1E-9926-4921-95AB-98F55E6D516A}" destId="{5AF6C592-FBD5-4B44-8411-A822379C5408}" srcOrd="4" destOrd="0" parTransId="{7745BCC2-49DF-4257-9248-701FBC173FCA}" sibTransId="{47D42404-83CD-43B3-958A-3E938CAAFD92}"/>
     <dgm:cxn modelId="{A0673DC0-9746-471E-959E-85786ACE3178}" srcId="{9751AA1E-9926-4921-95AB-98F55E6D516A}" destId="{9E8763A7-0DA5-4F1A-A006-6721BBBDF474}" srcOrd="0" destOrd="0" parTransId="{2E171029-663A-493B-85B2-53099295E37D}" sibTransId="{0D291144-9BC4-4D56-913F-C54ACBA9DD55}"/>
+    <dgm:cxn modelId="{CD033F0C-B554-4D4C-A719-ABE425C16B4D}" type="presOf" srcId="{9E8763A7-0DA5-4F1A-A006-6721BBBDF474}" destId="{56C188AC-E08A-4FA7-B593-5923AE52E53B}" srcOrd="0" destOrd="0" presId="urn:microsoft.com/office/officeart/2005/8/layout/default"/>
+    <dgm:cxn modelId="{630B1A05-B8FE-4FD3-9FBE-22B7DC24C356}" type="presOf" srcId="{4842BE4D-C5D1-4DE1-B196-985D4950C43C}" destId="{FED4C30F-0D25-4E55-930C-B6331A8324B6}" srcOrd="0" destOrd="0" presId="urn:microsoft.com/office/officeart/2005/8/layout/default"/>
+    <dgm:cxn modelId="{A82AB7EB-A5DB-4370-9EDD-86EE38954C5D}" srcId="{9751AA1E-9926-4921-95AB-98F55E6D516A}" destId="{A27FE082-A7EA-4AB6-90BB-8260FEB1954B}" srcOrd="3" destOrd="0" parTransId="{B6DCEC2C-C584-4B91-9143-375B9C3D7D50}" sibTransId="{4D6B4C43-6198-4547-A8A5-0DA87F13E502}"/>
+    <dgm:cxn modelId="{35D17342-4735-4AF4-8E1C-B1DD1C3762BF}" type="presOf" srcId="{5AF6C592-FBD5-4B44-8411-A822379C5408}" destId="{FC0754D9-D3C9-438C-A529-98BC696D00E4}" srcOrd="0" destOrd="0" presId="urn:microsoft.com/office/officeart/2005/8/layout/default"/>
     <dgm:cxn modelId="{625EF2C2-6738-4F5D-B7B9-C45CA7398590}" type="presOf" srcId="{A27FE082-A7EA-4AB6-90BB-8260FEB1954B}" destId="{3E1F281A-22EA-4524-8F6B-04A13ED7597B}" srcOrd="0" destOrd="0" presId="urn:microsoft.com/office/officeart/2005/8/layout/default"/>
-    <dgm:cxn modelId="{6A0345CC-E31B-453E-9BAC-50FE142EFDEC}" srcId="{9751AA1E-9926-4921-95AB-98F55E6D516A}" destId="{ED1F7831-1E81-44FA-BADA-B89C74D4EAD2}" srcOrd="5" destOrd="0" parTransId="{6A2F0721-235D-4AF8-816F-DEE9CF052B83}" sibTransId="{276F4ED2-6322-412E-9680-02602359B5FB}"/>
-    <dgm:cxn modelId="{875BD3D2-E407-4F85-853E-4D42A070BC4A}" srcId="{9751AA1E-9926-4921-95AB-98F55E6D516A}" destId="{5AF6C592-FBD5-4B44-8411-A822379C5408}" srcOrd="4" destOrd="0" parTransId="{7745BCC2-49DF-4257-9248-701FBC173FCA}" sibTransId="{47D42404-83CD-43B3-958A-3E938CAAFD92}"/>
-    <dgm:cxn modelId="{B74EB7E5-9625-472B-A55E-FC94AC7353CC}" srcId="{9751AA1E-9926-4921-95AB-98F55E6D516A}" destId="{58A4CE31-89D7-4960-B794-FCC931506AE8}" srcOrd="2" destOrd="0" parTransId="{98A1511F-D762-4B72-9121-615FD27A10EB}" sibTransId="{616933E6-AD4C-4F22-86E2-A4F89A564831}"/>
-    <dgm:cxn modelId="{A82AB7EB-A5DB-4370-9EDD-86EE38954C5D}" srcId="{9751AA1E-9926-4921-95AB-98F55E6D516A}" destId="{A27FE082-A7EA-4AB6-90BB-8260FEB1954B}" srcOrd="3" destOrd="0" parTransId="{B6DCEC2C-C584-4B91-9143-375B9C3D7D50}" sibTransId="{4D6B4C43-6198-4547-A8A5-0DA87F13E502}"/>
+    <dgm:cxn modelId="{5E21D17F-A8F6-437E-85EC-56F433400FDB}" type="presOf" srcId="{9751AA1E-9926-4921-95AB-98F55E6D516A}" destId="{34A8BDE5-A877-4888-96D2-655FB1291EED}" srcOrd="0" destOrd="0" presId="urn:microsoft.com/office/officeart/2005/8/layout/default"/>
     <dgm:cxn modelId="{78F4E68E-EEB5-4CE9-81F5-3D65E65BDFB3}" type="presParOf" srcId="{34A8BDE5-A877-4888-96D2-655FB1291EED}" destId="{56C188AC-E08A-4FA7-B593-5923AE52E53B}" srcOrd="0" destOrd="0" presId="urn:microsoft.com/office/officeart/2005/8/layout/default"/>
     <dgm:cxn modelId="{724C41B6-EBFD-4547-99E2-403D1B3FDC30}" type="presParOf" srcId="{34A8BDE5-A877-4888-96D2-655FB1291EED}" destId="{C11C458F-1DF9-45A1-B451-F9D5CC86DCC6}" srcOrd="1" destOrd="0" presId="urn:microsoft.com/office/officeart/2005/8/layout/default"/>
     <dgm:cxn modelId="{20AC79D6-0CA5-443E-B085-324FBAB3F350}" type="presParOf" srcId="{34A8BDE5-A877-4888-96D2-655FB1291EED}" destId="{FED4C30F-0D25-4E55-930C-B6331A8324B6}" srcOrd="2" destOrd="0" presId="urn:microsoft.com/office/officeart/2005/8/layout/default"/>
@@ -5199,7 +5353,7 @@
         </a:bodyPr>
         <a:lstStyle/>
         <a:p>
-          <a:pPr marL="0" lvl="0" indent="0" algn="l" defTabSz="800100">
+          <a:pPr lvl="0" algn="l" defTabSz="800100">
             <a:lnSpc>
               <a:spcPct val="90000"/>
             </a:lnSpc>
@@ -5209,7 +5363,6 @@
             <a:spcAft>
               <a:spcPct val="35000"/>
             </a:spcAft>
-            <a:buNone/>
           </a:pPr>
           <a:r>
             <a:rPr lang="de-DE" sz="1800" kern="1200" dirty="0">
@@ -5371,7 +5524,7 @@
         </a:bodyPr>
         <a:lstStyle/>
         <a:p>
-          <a:pPr marL="0" lvl="0" indent="0" algn="l" defTabSz="800100">
+          <a:pPr lvl="0" algn="l" defTabSz="800100">
             <a:lnSpc>
               <a:spcPct val="90000"/>
             </a:lnSpc>
@@ -5381,7 +5534,6 @@
             <a:spcAft>
               <a:spcPct val="35000"/>
             </a:spcAft>
-            <a:buNone/>
           </a:pPr>
           <a:r>
             <a:rPr lang="de-DE" sz="1800" kern="1200" dirty="0">
@@ -5607,7 +5759,7 @@
         </a:bodyPr>
         <a:lstStyle/>
         <a:p>
-          <a:pPr marL="0" lvl="0" indent="0" algn="ctr" defTabSz="711200">
+          <a:pPr lvl="0" algn="ctr" defTabSz="711200">
             <a:lnSpc>
               <a:spcPct val="90000"/>
             </a:lnSpc>
@@ -5617,7 +5769,6 @@
             <a:spcAft>
               <a:spcPct val="35000"/>
             </a:spcAft>
-            <a:buNone/>
           </a:pPr>
           <a:r>
             <a:rPr lang="de-DE" sz="1600" kern="1200" dirty="0">
@@ -5687,7 +5838,7 @@
         </a:bodyPr>
         <a:lstStyle/>
         <a:p>
-          <a:pPr marL="0" lvl="0" indent="0" algn="ctr" defTabSz="711200">
+          <a:pPr lvl="0" algn="ctr" defTabSz="711200">
             <a:lnSpc>
               <a:spcPct val="90000"/>
             </a:lnSpc>
@@ -5697,7 +5848,6 @@
             <a:spcAft>
               <a:spcPct val="35000"/>
             </a:spcAft>
-            <a:buNone/>
           </a:pPr>
           <a:r>
             <a:rPr lang="de-DE" sz="1600" kern="1200" dirty="0">
@@ -5767,7 +5917,7 @@
         </a:bodyPr>
         <a:lstStyle/>
         <a:p>
-          <a:pPr marL="0" lvl="0" indent="0" algn="ctr" defTabSz="711200">
+          <a:pPr lvl="0" algn="ctr" defTabSz="711200">
             <a:lnSpc>
               <a:spcPct val="90000"/>
             </a:lnSpc>
@@ -5777,15 +5927,18 @@
             <a:spcAft>
               <a:spcPct val="35000"/>
             </a:spcAft>
-            <a:buNone/>
           </a:pPr>
           <a:r>
-            <a:rPr lang="de-DE" sz="1600" kern="1200" dirty="0">
+            <a:rPr lang="de-DE" sz="1600" kern="1200" dirty="0" smtClean="0">
               <a:latin typeface="Calibri" panose="020F0502020204030204" pitchFamily="34" charset="0"/>
               <a:cs typeface="Calibri" panose="020F0502020204030204" pitchFamily="34" charset="0"/>
             </a:rPr>
             <a:t>Boolean an Server</a:t>
           </a:r>
+          <a:endParaRPr lang="de-DE" sz="1600" kern="1200" dirty="0">
+            <a:latin typeface="Calibri" panose="020F0502020204030204" pitchFamily="34" charset="0"/>
+            <a:cs typeface="Calibri" panose="020F0502020204030204" pitchFamily="34" charset="0"/>
+          </a:endParaRPr>
         </a:p>
       </dsp:txBody>
       <dsp:txXfrm>
@@ -5859,7 +6012,7 @@
         </a:bodyPr>
         <a:lstStyle/>
         <a:p>
-          <a:pPr marL="0" lvl="0" indent="0" algn="ctr" defTabSz="800100">
+          <a:pPr lvl="0" algn="ctr" defTabSz="800100">
             <a:lnSpc>
               <a:spcPct val="90000"/>
             </a:lnSpc>
@@ -5869,7 +6022,6 @@
             <a:spcAft>
               <a:spcPct val="35000"/>
             </a:spcAft>
-            <a:buNone/>
           </a:pPr>
           <a:r>
             <a:rPr lang="de-DE" sz="1800" kern="1200" dirty="0">
@@ -6148,7 +6300,7 @@
         </a:bodyPr>
         <a:lstStyle/>
         <a:p>
-          <a:pPr marL="0" lvl="0" indent="0" algn="ctr" defTabSz="800100">
+          <a:pPr lvl="0" algn="ctr" defTabSz="800100">
             <a:lnSpc>
               <a:spcPct val="90000"/>
             </a:lnSpc>
@@ -6158,7 +6310,6 @@
             <a:spcAft>
               <a:spcPct val="35000"/>
             </a:spcAft>
-            <a:buNone/>
           </a:pPr>
           <a:r>
             <a:rPr lang="de-DE" sz="1800" kern="1200" dirty="0">
@@ -6395,7 +6546,7 @@
         </a:bodyPr>
         <a:lstStyle/>
         <a:p>
-          <a:pPr marL="0" lvl="0" indent="0" algn="ctr" defTabSz="800100">
+          <a:pPr lvl="0" algn="ctr" defTabSz="800100">
             <a:lnSpc>
               <a:spcPct val="90000"/>
             </a:lnSpc>
@@ -6405,7 +6556,6 @@
             <a:spcAft>
               <a:spcPct val="35000"/>
             </a:spcAft>
-            <a:buNone/>
           </a:pPr>
           <a:r>
             <a:rPr lang="de-DE" sz="1800" kern="1200" dirty="0">
@@ -6590,7 +6740,7 @@
         </a:bodyPr>
         <a:lstStyle/>
         <a:p>
-          <a:pPr marL="0" lvl="0" indent="0" algn="ctr" defTabSz="800100">
+          <a:pPr lvl="0" algn="ctr" defTabSz="800100">
             <a:lnSpc>
               <a:spcPct val="90000"/>
             </a:lnSpc>
@@ -6600,7 +6750,6 @@
             <a:spcAft>
               <a:spcPct val="35000"/>
             </a:spcAft>
-            <a:buNone/>
           </a:pPr>
           <a:r>
             <a:rPr lang="de-DE" sz="1800" kern="1200" dirty="0">
@@ -6611,7 +6760,7 @@
           </a:r>
         </a:p>
         <a:p>
-          <a:pPr marL="0" lvl="0" indent="0" algn="ctr" defTabSz="800100">
+          <a:pPr lvl="0" algn="ctr" defTabSz="800100">
             <a:lnSpc>
               <a:spcPct val="90000"/>
             </a:lnSpc>
@@ -6621,7 +6770,6 @@
             <a:spcAft>
               <a:spcPct val="35000"/>
             </a:spcAft>
-            <a:buNone/>
           </a:pPr>
           <a:r>
             <a:rPr lang="de-DE" sz="1800" kern="1200" dirty="0">
@@ -6694,7 +6842,7 @@
         </a:bodyPr>
         <a:lstStyle/>
         <a:p>
-          <a:pPr marL="0" lvl="0" indent="0" algn="ctr" defTabSz="800100">
+          <a:pPr lvl="0" algn="ctr" defTabSz="800100">
             <a:lnSpc>
               <a:spcPct val="90000"/>
             </a:lnSpc>
@@ -6704,7 +6852,6 @@
             <a:spcAft>
               <a:spcPct val="35000"/>
             </a:spcAft>
-            <a:buNone/>
           </a:pPr>
           <a:r>
             <a:rPr lang="de-DE" sz="1800" kern="1200" dirty="0">
@@ -6726,7 +6873,7 @@
           </a:endParaRPr>
         </a:p>
         <a:p>
-          <a:pPr marL="0" lvl="0" indent="0" algn="ctr" defTabSz="800100">
+          <a:pPr lvl="0" algn="ctr" defTabSz="800100">
             <a:lnSpc>
               <a:spcPct val="90000"/>
             </a:lnSpc>
@@ -6736,7 +6883,6 @@
             <a:spcAft>
               <a:spcPct val="35000"/>
             </a:spcAft>
-            <a:buNone/>
           </a:pPr>
           <a:r>
             <a:rPr lang="de-DE" sz="1800" kern="1200" dirty="0">
@@ -6747,7 +6893,7 @@
           </a:r>
         </a:p>
         <a:p>
-          <a:pPr marL="0" lvl="0" indent="0" algn="ctr" defTabSz="800100">
+          <a:pPr lvl="0" algn="ctr" defTabSz="800100">
             <a:lnSpc>
               <a:spcPct val="90000"/>
             </a:lnSpc>
@@ -6757,7 +6903,6 @@
             <a:spcAft>
               <a:spcPct val="35000"/>
             </a:spcAft>
-            <a:buNone/>
           </a:pPr>
           <a:r>
             <a:rPr lang="de-DE" sz="1800" kern="1200" dirty="0">
@@ -6841,7 +6986,7 @@
         </a:bodyPr>
         <a:lstStyle/>
         <a:p>
-          <a:pPr marL="0" lvl="0" indent="0" algn="ctr" defTabSz="800100">
+          <a:pPr lvl="0" algn="ctr" defTabSz="800100">
             <a:lnSpc>
               <a:spcPct val="90000"/>
             </a:lnSpc>
@@ -6851,7 +6996,6 @@
             <a:spcAft>
               <a:spcPct val="35000"/>
             </a:spcAft>
-            <a:buNone/>
           </a:pPr>
           <a:r>
             <a:rPr lang="de-DE" sz="1800" kern="1200" dirty="0">
@@ -6862,7 +7006,7 @@
           </a:r>
         </a:p>
         <a:p>
-          <a:pPr marL="0" lvl="0" indent="0" algn="ctr" defTabSz="800100">
+          <a:pPr lvl="0" algn="ctr" defTabSz="800100">
             <a:lnSpc>
               <a:spcPct val="90000"/>
             </a:lnSpc>
@@ -6872,7 +7016,6 @@
             <a:spcAft>
               <a:spcPct val="35000"/>
             </a:spcAft>
-            <a:buNone/>
           </a:pPr>
           <a:r>
             <a:rPr lang="de-DE" sz="1800" kern="1200" dirty="0">
@@ -6883,7 +7026,7 @@
           </a:r>
         </a:p>
         <a:p>
-          <a:pPr marL="0" lvl="0" indent="0" algn="ctr" defTabSz="800100">
+          <a:pPr lvl="0" algn="ctr" defTabSz="800100">
             <a:lnSpc>
               <a:spcPct val="90000"/>
             </a:lnSpc>
@@ -6893,7 +7036,6 @@
             <a:spcAft>
               <a:spcPct val="35000"/>
             </a:spcAft>
-            <a:buNone/>
           </a:pPr>
           <a:r>
             <a:rPr lang="de-DE" sz="1800" kern="1200" dirty="0">
@@ -6963,7 +7105,7 @@
         </a:bodyPr>
         <a:lstStyle/>
         <a:p>
-          <a:pPr marL="0" lvl="0" indent="0" algn="ctr" defTabSz="800100">
+          <a:pPr lvl="0" algn="ctr" defTabSz="800100">
             <a:lnSpc>
               <a:spcPct val="90000"/>
             </a:lnSpc>
@@ -6973,7 +7115,6 @@
             <a:spcAft>
               <a:spcPct val="35000"/>
             </a:spcAft>
-            <a:buNone/>
           </a:pPr>
           <a:r>
             <a:rPr lang="de-DE" sz="1800" kern="1200" dirty="0">
@@ -6984,7 +7125,7 @@
           </a:r>
         </a:p>
         <a:p>
-          <a:pPr marL="0" lvl="0" indent="0" algn="ctr" defTabSz="800100">
+          <a:pPr lvl="0" algn="ctr" defTabSz="800100">
             <a:lnSpc>
               <a:spcPct val="90000"/>
             </a:lnSpc>
@@ -6994,7 +7135,6 @@
             <a:spcAft>
               <a:spcPct val="35000"/>
             </a:spcAft>
-            <a:buNone/>
           </a:pPr>
           <a:r>
             <a:rPr lang="de-DE" sz="1800" kern="1200" dirty="0">
@@ -7071,7 +7211,7 @@
         </a:bodyPr>
         <a:lstStyle/>
         <a:p>
-          <a:pPr marL="0" lvl="0" indent="0" algn="ctr" defTabSz="800100">
+          <a:pPr lvl="0" algn="ctr" defTabSz="800100">
             <a:lnSpc>
               <a:spcPct val="90000"/>
             </a:lnSpc>
@@ -7081,7 +7221,6 @@
             <a:spcAft>
               <a:spcPct val="35000"/>
             </a:spcAft>
-            <a:buNone/>
           </a:pPr>
           <a:r>
             <a:rPr lang="de-DE" sz="1800" kern="1200" dirty="0">
@@ -7103,7 +7242,7 @@
           </a:endParaRPr>
         </a:p>
         <a:p>
-          <a:pPr marL="0" lvl="0" indent="0" algn="ctr" defTabSz="800100">
+          <a:pPr lvl="0" algn="ctr" defTabSz="800100">
             <a:lnSpc>
               <a:spcPct val="90000"/>
             </a:lnSpc>
@@ -7113,7 +7252,6 @@
             <a:spcAft>
               <a:spcPct val="35000"/>
             </a:spcAft>
-            <a:buNone/>
           </a:pPr>
           <a:r>
             <a:rPr lang="de-DE" sz="1800" kern="1200" dirty="0">
@@ -7135,7 +7273,7 @@
           </a:endParaRPr>
         </a:p>
         <a:p>
-          <a:pPr marL="0" lvl="0" indent="0" algn="ctr" defTabSz="800100">
+          <a:pPr lvl="0" algn="ctr" defTabSz="800100">
             <a:lnSpc>
               <a:spcPct val="90000"/>
             </a:lnSpc>
@@ -7145,7 +7283,6 @@
             <a:spcAft>
               <a:spcPct val="35000"/>
             </a:spcAft>
-            <a:buNone/>
           </a:pPr>
           <a:r>
             <a:rPr lang="de-DE" sz="1800" kern="1200" dirty="0">
@@ -7215,7 +7352,7 @@
         </a:bodyPr>
         <a:lstStyle/>
         <a:p>
-          <a:pPr marL="0" lvl="0" indent="0" algn="ctr" defTabSz="800100">
+          <a:pPr lvl="0" algn="ctr" defTabSz="800100">
             <a:lnSpc>
               <a:spcPct val="90000"/>
             </a:lnSpc>
@@ -7225,7 +7362,6 @@
             <a:spcAft>
               <a:spcPct val="35000"/>
             </a:spcAft>
-            <a:buNone/>
           </a:pPr>
           <a:r>
             <a:rPr lang="de-DE" sz="1800" kern="1200" dirty="0">
@@ -7236,7 +7372,7 @@
           </a:r>
         </a:p>
         <a:p>
-          <a:pPr marL="0" lvl="0" indent="0" algn="ctr" defTabSz="800100">
+          <a:pPr lvl="0" algn="ctr" defTabSz="800100">
             <a:lnSpc>
               <a:spcPct val="90000"/>
             </a:lnSpc>
@@ -7246,7 +7382,6 @@
             <a:spcAft>
               <a:spcPct val="35000"/>
             </a:spcAft>
-            <a:buNone/>
           </a:pPr>
           <a:r>
             <a:rPr lang="de-DE" sz="1800" kern="1200" dirty="0">
@@ -12298,7 +12433,7 @@
           <a:p>
             <a:fld id="{024BBB52-B919-4BB9-8631-C4B973208B51}" type="datetimeFigureOut">
               <a:rPr lang="de-CH" smtClean="0"/>
-              <a:t>30.05.2017</a:t>
+              <a:t>31.05.17</a:t>
             </a:fld>
             <a:endParaRPr lang="de-CH"/>
           </a:p>
@@ -12457,7 +12592,7 @@
           <a:p>
             <a:fld id="{49441513-F160-4B04-8F36-9269272642E0}" type="slidenum">
               <a:rPr lang="de-CH" smtClean="0"/>
-              <a:t>‹Nr.›</a:t>
+              <a:t>‹#›</a:t>
             </a:fld>
             <a:endParaRPr lang="de-CH"/>
           </a:p>
@@ -12737,7 +12872,7 @@
           <a:p>
             <a:fld id="{8EA9CA9E-C2E4-4F31-9F02-DF9B77C22F3C}" type="datetime1">
               <a:rPr lang="en-US" smtClean="0"/>
-              <a:t>5/30/2017</a:t>
+              <a:t>5/31/17</a:t>
             </a:fld>
             <a:endParaRPr lang="en-US" dirty="0"/>
           </a:p>
@@ -12783,7 +12918,7 @@
           <a:p>
             <a:fld id="{6D22F896-40B5-4ADD-8801-0D06FADFA095}" type="slidenum">
               <a:rPr lang="en-US" smtClean="0"/>
-              <a:t>‹Nr.›</a:t>
+              <a:t>‹#›</a:t>
             </a:fld>
             <a:endParaRPr lang="en-US" dirty="0"/>
           </a:p>
@@ -13053,7 +13188,7 @@
           <a:p>
             <a:fld id="{9F8640C0-E1E3-415D-B87C-035A2E2BD191}" type="datetime1">
               <a:rPr lang="en-US" smtClean="0"/>
-              <a:t>5/30/2017</a:t>
+              <a:t>5/31/17</a:t>
             </a:fld>
             <a:endParaRPr lang="en-US" dirty="0"/>
           </a:p>
@@ -13100,7 +13235,7 @@
             <a:fld id="{6D22F896-40B5-4ADD-8801-0D06FADFA095}" type="slidenum">
               <a:rPr lang="en-US" smtClean="0"/>
               <a:pPr/>
-              <a:t>‹Nr.›</a:t>
+              <a:t>‹#›</a:t>
             </a:fld>
             <a:endParaRPr lang="en-US" dirty="0"/>
           </a:p>
@@ -13280,7 +13415,7 @@
           <a:p>
             <a:fld id="{897AC9D3-397F-4762-BB50-37F9D70EBF02}" type="datetime1">
               <a:rPr lang="en-US" smtClean="0"/>
-              <a:t>5/30/2017</a:t>
+              <a:t>5/31/17</a:t>
             </a:fld>
             <a:endParaRPr lang="en-US" dirty="0"/>
           </a:p>
@@ -13327,7 +13462,7 @@
             <a:fld id="{6D22F896-40B5-4ADD-8801-0D06FADFA095}" type="slidenum">
               <a:rPr lang="en-US" smtClean="0"/>
               <a:pPr/>
-              <a:t>‹Nr.›</a:t>
+              <a:t>‹#›</a:t>
             </a:fld>
             <a:endParaRPr lang="en-US" dirty="0"/>
           </a:p>
@@ -13576,7 +13711,7 @@
           <a:p>
             <a:fld id="{3AD2E4A6-2EC4-4272-8C47-4624C3267433}" type="datetime1">
               <a:rPr lang="en-US" smtClean="0"/>
-              <a:t>5/30/2017</a:t>
+              <a:t>5/31/17</a:t>
             </a:fld>
             <a:endParaRPr lang="en-US" dirty="0"/>
           </a:p>
@@ -13623,7 +13758,7 @@
             <a:fld id="{6D22F896-40B5-4ADD-8801-0D06FADFA095}" type="slidenum">
               <a:rPr lang="en-US" smtClean="0"/>
               <a:pPr/>
-              <a:t>‹Nr.›</a:t>
+              <a:t>‹#›</a:t>
             </a:fld>
             <a:endParaRPr lang="en-US" dirty="0"/>
           </a:p>
@@ -14035,7 +14170,7 @@
           <a:p>
             <a:fld id="{AEDB761C-7330-457D-9CDF-0A4672C67C59}" type="datetime1">
               <a:rPr lang="en-US" smtClean="0"/>
-              <a:t>5/30/2017</a:t>
+              <a:t>5/31/17</a:t>
             </a:fld>
             <a:endParaRPr lang="en-US" dirty="0"/>
           </a:p>
@@ -14082,7 +14217,7 @@
             <a:fld id="{6D22F896-40B5-4ADD-8801-0D06FADFA095}" type="slidenum">
               <a:rPr lang="en-US" smtClean="0"/>
               <a:pPr/>
-              <a:t>‹Nr.›</a:t>
+              <a:t>‹#›</a:t>
             </a:fld>
             <a:endParaRPr lang="en-US" dirty="0"/>
           </a:p>
@@ -14616,7 +14751,7 @@
           <a:p>
             <a:fld id="{0D4C989C-B4CF-40E4-BB76-A11157D33030}" type="datetime1">
               <a:rPr lang="en-US" smtClean="0"/>
-              <a:t>5/30/2017</a:t>
+              <a:t>5/31/17</a:t>
             </a:fld>
             <a:endParaRPr lang="en-US" dirty="0"/>
           </a:p>
@@ -14663,7 +14798,7 @@
             <a:fld id="{6D22F896-40B5-4ADD-8801-0D06FADFA095}" type="slidenum">
               <a:rPr lang="en-US" smtClean="0"/>
               <a:pPr/>
-              <a:t>‹Nr.›</a:t>
+              <a:t>‹#›</a:t>
             </a:fld>
             <a:endParaRPr lang="en-US" dirty="0"/>
           </a:p>
@@ -15473,7 +15608,7 @@
           <a:p>
             <a:fld id="{2A7F0560-601C-4CE0-A30A-3FC90EA4C236}" type="datetime1">
               <a:rPr lang="en-US" smtClean="0"/>
-              <a:t>5/30/2017</a:t>
+              <a:t>5/31/17</a:t>
             </a:fld>
             <a:endParaRPr lang="en-US" dirty="0"/>
           </a:p>
@@ -15520,7 +15655,7 @@
             <a:fld id="{6D22F896-40B5-4ADD-8801-0D06FADFA095}" type="slidenum">
               <a:rPr lang="en-US" smtClean="0"/>
               <a:pPr/>
-              <a:t>‹Nr.›</a:t>
+              <a:t>‹#›</a:t>
             </a:fld>
             <a:endParaRPr lang="en-US" dirty="0"/>
           </a:p>
@@ -15683,7 +15818,7 @@
           <a:p>
             <a:fld id="{00B4CC81-E759-47F2-925F-AB318FB5256D}" type="datetime1">
               <a:rPr lang="en-US" smtClean="0"/>
-              <a:t>5/30/2017</a:t>
+              <a:t>5/31/17</a:t>
             </a:fld>
             <a:endParaRPr lang="en-US" dirty="0"/>
           </a:p>
@@ -15729,7 +15864,7 @@
           <a:p>
             <a:fld id="{6D22F896-40B5-4ADD-8801-0D06FADFA095}" type="slidenum">
               <a:rPr lang="en-US" smtClean="0"/>
-              <a:t>‹Nr.›</a:t>
+              <a:t>‹#›</a:t>
             </a:fld>
             <a:endParaRPr lang="en-US" dirty="0"/>
           </a:p>
@@ -15901,7 +16036,7 @@
           <a:p>
             <a:fld id="{02CD0DA6-9D54-4B21-8112-8876D34A9E81}" type="datetime1">
               <a:rPr lang="en-US" smtClean="0"/>
-              <a:t>5/30/2017</a:t>
+              <a:t>5/31/17</a:t>
             </a:fld>
             <a:endParaRPr lang="en-US" dirty="0"/>
           </a:p>
@@ -15947,7 +16082,7 @@
           <a:p>
             <a:fld id="{6D22F896-40B5-4ADD-8801-0D06FADFA095}" type="slidenum">
               <a:rPr lang="en-US" smtClean="0"/>
-              <a:t>‹Nr.›</a:t>
+              <a:t>‹#›</a:t>
             </a:fld>
             <a:endParaRPr lang="en-US" dirty="0"/>
           </a:p>
@@ -16110,7 +16245,7 @@
           <a:p>
             <a:fld id="{B8F4533B-A850-4A2F-8185-7CB3D8266C51}" type="datetime1">
               <a:rPr lang="en-US" smtClean="0"/>
-              <a:t>5/30/2017</a:t>
+              <a:t>5/31/17</a:t>
             </a:fld>
             <a:endParaRPr lang="en-US" dirty="0"/>
           </a:p>
@@ -16156,7 +16291,7 @@
           <a:p>
             <a:fld id="{6D22F896-40B5-4ADD-8801-0D06FADFA095}" type="slidenum">
               <a:rPr lang="en-US" smtClean="0"/>
-              <a:t>‹Nr.›</a:t>
+              <a:t>‹#›</a:t>
             </a:fld>
             <a:endParaRPr lang="en-US" dirty="0"/>
           </a:p>
@@ -16394,7 +16529,7 @@
           <a:p>
             <a:fld id="{540D137B-B99E-4E86-A95E-19F6085EB080}" type="datetime1">
               <a:rPr lang="en-US" smtClean="0"/>
-              <a:t>5/30/2017</a:t>
+              <a:t>5/31/17</a:t>
             </a:fld>
             <a:endParaRPr lang="en-US" dirty="0"/>
           </a:p>
@@ -16440,7 +16575,7 @@
           <a:p>
             <a:fld id="{6D22F896-40B5-4ADD-8801-0D06FADFA095}" type="slidenum">
               <a:rPr lang="en-US" smtClean="0"/>
-              <a:t>‹Nr.›</a:t>
+              <a:t>‹#›</a:t>
             </a:fld>
             <a:endParaRPr lang="en-US" dirty="0"/>
           </a:p>
@@ -16665,7 +16800,7 @@
           <a:p>
             <a:fld id="{67691E83-D626-4284-8016-73A5B41BCA73}" type="datetime1">
               <a:rPr lang="en-US" smtClean="0"/>
-              <a:t>5/30/2017</a:t>
+              <a:t>5/31/17</a:t>
             </a:fld>
             <a:endParaRPr lang="en-US" dirty="0"/>
           </a:p>
@@ -16711,7 +16846,7 @@
           <a:p>
             <a:fld id="{6D22F896-40B5-4ADD-8801-0D06FADFA095}" type="slidenum">
               <a:rPr lang="en-US" smtClean="0"/>
-              <a:t>‹Nr.›</a:t>
+              <a:t>‹#›</a:t>
             </a:fld>
             <a:endParaRPr lang="en-US" dirty="0"/>
           </a:p>
@@ -17084,7 +17219,7 @@
           <a:p>
             <a:fld id="{34302A22-E987-4D98-8C16-4C63E00AB357}" type="datetime1">
               <a:rPr lang="en-US" smtClean="0"/>
-              <a:t>5/30/2017</a:t>
+              <a:t>5/31/17</a:t>
             </a:fld>
             <a:endParaRPr lang="en-US" dirty="0"/>
           </a:p>
@@ -17130,7 +17265,7 @@
           <a:p>
             <a:fld id="{6D22F896-40B5-4ADD-8801-0D06FADFA095}" type="slidenum">
               <a:rPr lang="en-US" smtClean="0"/>
-              <a:t>‹Nr.›</a:t>
+              <a:t>‹#›</a:t>
             </a:fld>
             <a:endParaRPr lang="en-US" dirty="0"/>
           </a:p>
@@ -17236,7 +17371,7 @@
           <a:p>
             <a:fld id="{453D193F-146F-413A-B34D-74AD821309B0}" type="datetime1">
               <a:rPr lang="en-US" smtClean="0"/>
-              <a:t>5/30/2017</a:t>
+              <a:t>5/31/17</a:t>
             </a:fld>
             <a:endParaRPr lang="en-US" dirty="0"/>
           </a:p>
@@ -17282,7 +17417,7 @@
           <a:p>
             <a:fld id="{6D22F896-40B5-4ADD-8801-0D06FADFA095}" type="slidenum">
               <a:rPr lang="en-US" smtClean="0"/>
-              <a:t>‹Nr.›</a:t>
+              <a:t>‹#›</a:t>
             </a:fld>
             <a:endParaRPr lang="en-US" dirty="0"/>
           </a:p>
@@ -17365,7 +17500,7 @@
           <a:p>
             <a:fld id="{63B06315-44C8-4DA5-8C1B-E5875BBEC500}" type="datetime1">
               <a:rPr lang="en-US" smtClean="0"/>
-              <a:t>5/30/2017</a:t>
+              <a:t>5/31/17</a:t>
             </a:fld>
             <a:endParaRPr lang="en-US" dirty="0"/>
           </a:p>
@@ -17411,7 +17546,7 @@
           <a:p>
             <a:fld id="{6D22F896-40B5-4ADD-8801-0D06FADFA095}" type="slidenum">
               <a:rPr lang="en-US" smtClean="0"/>
-              <a:t>‹Nr.›</a:t>
+              <a:t>‹#›</a:t>
             </a:fld>
             <a:endParaRPr lang="en-US" dirty="0"/>
           </a:p>
@@ -17648,7 +17783,7 @@
           <a:p>
             <a:fld id="{D9434E90-BFC5-4E87-9954-FBF5F6558AF6}" type="datetime1">
               <a:rPr lang="en-US" smtClean="0"/>
-              <a:t>5/30/2017</a:t>
+              <a:t>5/31/17</a:t>
             </a:fld>
             <a:endParaRPr lang="en-US" dirty="0"/>
           </a:p>
@@ -17694,7 +17829,7 @@
           <a:p>
             <a:fld id="{6D22F896-40B5-4ADD-8801-0D06FADFA095}" type="slidenum">
               <a:rPr lang="en-US" smtClean="0"/>
-              <a:t>‹Nr.›</a:t>
+              <a:t>‹#›</a:t>
             </a:fld>
             <a:endParaRPr lang="en-US" dirty="0"/>
           </a:p>
@@ -17964,7 +18099,7 @@
           <a:p>
             <a:fld id="{74F7EEDC-D137-4331-8EC7-ABA302E14443}" type="datetime1">
               <a:rPr lang="en-US" smtClean="0"/>
-              <a:t>5/30/2017</a:t>
+              <a:t>5/31/17</a:t>
             </a:fld>
             <a:endParaRPr lang="en-US" dirty="0"/>
           </a:p>
@@ -18010,7 +18145,7 @@
           <a:p>
             <a:fld id="{6D22F896-40B5-4ADD-8801-0D06FADFA095}" type="slidenum">
               <a:rPr lang="en-US" smtClean="0"/>
-              <a:t>‹Nr.›</a:t>
+              <a:t>‹#›</a:t>
             </a:fld>
             <a:endParaRPr lang="en-US" dirty="0"/>
           </a:p>
@@ -18221,7 +18356,7 @@
           <a:p>
             <a:fld id="{647DF8E9-8DC5-45ED-960B-7E1ED08FAAAE}" type="datetime1">
               <a:rPr lang="en-US" smtClean="0"/>
-              <a:t>5/30/2017</a:t>
+              <a:t>5/31/17</a:t>
             </a:fld>
             <a:endParaRPr lang="en-US" dirty="0"/>
           </a:p>
@@ -18300,7 +18435,7 @@
             <a:fld id="{6D22F896-40B5-4ADD-8801-0D06FADFA095}" type="slidenum">
               <a:rPr lang="en-US" smtClean="0"/>
               <a:pPr/>
-              <a:t>‹Nr.›</a:t>
+              <a:t>‹#›</a:t>
             </a:fld>
             <a:endParaRPr lang="en-US" dirty="0"/>
           </a:p>
@@ -18787,6 +18922,14 @@
                 <a:cs typeface="Calibri Light" panose="020F0302020204030204" pitchFamily="34" charset="0"/>
               </a:rPr>
             </a:br>
+            <a:r>
+              <a:rPr lang="de-CH" sz="4000" cap="none" dirty="0">
+                <a:latin typeface="Calibri" panose="020F0502020204030204" pitchFamily="34" charset="0"/>
+                <a:ea typeface="+mn-ea"/>
+                <a:cs typeface="Calibri" panose="020F0502020204030204" pitchFamily="34" charset="0"/>
+              </a:rPr>
+              <a:t/>
+            </a:r>
             <a:br>
               <a:rPr lang="de-CH" sz="4000" cap="none" dirty="0">
                 <a:latin typeface="Calibri" panose="020F0502020204030204" pitchFamily="34" charset="0"/>
@@ -18915,12 +19058,26 @@
           <a:bodyPr/>
           <a:lstStyle/>
           <a:p>
+            <a:r>
+              <a:rPr lang="de-DE" cap="none" dirty="0">
+                <a:latin typeface="Calibri" panose="020F0502020204030204" pitchFamily="34" charset="0"/>
+                <a:cs typeface="Calibri" panose="020F0502020204030204" pitchFamily="34" charset="0"/>
+              </a:rPr>
+              <a:t/>
+            </a:r>
             <a:br>
               <a:rPr lang="de-DE" cap="none" dirty="0">
                 <a:latin typeface="Calibri" panose="020F0502020204030204" pitchFamily="34" charset="0"/>
                 <a:cs typeface="Calibri" panose="020F0502020204030204" pitchFamily="34" charset="0"/>
               </a:rPr>
             </a:br>
+            <a:r>
+              <a:rPr lang="de-DE" cap="none" dirty="0">
+                <a:latin typeface="Calibri" panose="020F0502020204030204" pitchFamily="34" charset="0"/>
+                <a:cs typeface="Calibri" panose="020F0502020204030204" pitchFamily="34" charset="0"/>
+              </a:rPr>
+              <a:t/>
+            </a:r>
             <a:br>
               <a:rPr lang="de-DE" cap="none" dirty="0">
                 <a:latin typeface="Calibri" panose="020F0502020204030204" pitchFamily="34" charset="0"/>
@@ -18940,6 +19097,13 @@
                 <a:cs typeface="Calibri" panose="020F0502020204030204" pitchFamily="34" charset="0"/>
               </a:rPr>
             </a:br>
+            <a:r>
+              <a:rPr lang="de-DE" cap="none" dirty="0">
+                <a:latin typeface="Calibri" panose="020F0502020204030204" pitchFamily="34" charset="0"/>
+                <a:cs typeface="Calibri" panose="020F0502020204030204" pitchFamily="34" charset="0"/>
+              </a:rPr>
+              <a:t/>
+            </a:r>
             <a:br>
               <a:rPr lang="de-DE" cap="none" dirty="0">
                 <a:latin typeface="Calibri" panose="020F0502020204030204" pitchFamily="34" charset="0"/>
@@ -19134,7 +19298,7 @@
                 <a14:useLocalDpi xmlns:a14="http://schemas.microsoft.com/office/drawing/2010/main" val="0"/>
               </a:ext>
               <a:ext uri="{96DAC541-7B7A-43D3-8B79-37D633B846F1}">
-                <asvg:svgBlip xmlns:asvg="http://schemas.microsoft.com/office/drawing/2016/SVG/main" r:embed="rId8"/>
+                <asvg:svgBlip xmlns:asvg="http://schemas.microsoft.com/office/drawing/2016/SVG/main" xmlns="" r:embed="rId8"/>
               </a:ext>
             </a:extLst>
           </a:blip>
@@ -19189,7 +19353,7 @@
                 <a14:useLocalDpi xmlns:a14="http://schemas.microsoft.com/office/drawing/2010/main" val="0"/>
               </a:ext>
               <a:ext uri="{96DAC541-7B7A-43D3-8B79-37D633B846F1}">
-                <asvg:svgBlip xmlns:asvg="http://schemas.microsoft.com/office/drawing/2016/SVG/main" r:embed="rId15"/>
+                <asvg:svgBlip xmlns:asvg="http://schemas.microsoft.com/office/drawing/2016/SVG/main" xmlns="" r:embed="rId15"/>
               </a:ext>
             </a:extLst>
           </a:blip>
@@ -19363,18 +19527,39 @@
             </a:lvl1pPr>
           </a:lstStyle>
           <a:p>
+            <a:r>
+              <a:rPr lang="de-DE" cap="none" dirty="0">
+                <a:latin typeface="Calibri" panose="020F0502020204030204" pitchFamily="34" charset="0"/>
+                <a:cs typeface="Calibri" panose="020F0502020204030204" pitchFamily="34" charset="0"/>
+              </a:rPr>
+              <a:t/>
+            </a:r>
             <a:br>
               <a:rPr lang="de-DE" cap="none" dirty="0">
                 <a:latin typeface="Calibri" panose="020F0502020204030204" pitchFamily="34" charset="0"/>
                 <a:cs typeface="Calibri" panose="020F0502020204030204" pitchFamily="34" charset="0"/>
               </a:rPr>
             </a:br>
+            <a:r>
+              <a:rPr lang="de-DE" cap="none" dirty="0">
+                <a:latin typeface="Calibri" panose="020F0502020204030204" pitchFamily="34" charset="0"/>
+                <a:cs typeface="Calibri" panose="020F0502020204030204" pitchFamily="34" charset="0"/>
+              </a:rPr>
+              <a:t/>
+            </a:r>
             <a:br>
               <a:rPr lang="de-DE" cap="none" dirty="0">
                 <a:latin typeface="Calibri" panose="020F0502020204030204" pitchFamily="34" charset="0"/>
                 <a:cs typeface="Calibri" panose="020F0502020204030204" pitchFamily="34" charset="0"/>
               </a:rPr>
             </a:br>
+            <a:r>
+              <a:rPr lang="de-DE" cap="none" dirty="0">
+                <a:latin typeface="Calibri" panose="020F0502020204030204" pitchFamily="34" charset="0"/>
+                <a:cs typeface="Calibri" panose="020F0502020204030204" pitchFamily="34" charset="0"/>
+              </a:rPr>
+              <a:t/>
+            </a:r>
             <a:br>
               <a:rPr lang="de-DE" cap="none" dirty="0">
                 <a:latin typeface="Calibri" panose="020F0502020204030204" pitchFamily="34" charset="0"/>
@@ -19426,7 +19611,7 @@
                 <a14:useLocalDpi xmlns:a14="http://schemas.microsoft.com/office/drawing/2010/main" val="0"/>
               </a:ext>
               <a:ext uri="{96DAC541-7B7A-43D3-8B79-37D633B846F1}">
-                <asvg:svgBlip xmlns:asvg="http://schemas.microsoft.com/office/drawing/2016/SVG/main" r:embed="rId3"/>
+                <asvg:svgBlip xmlns:asvg="http://schemas.microsoft.com/office/drawing/2016/SVG/main" xmlns="" r:embed="rId3"/>
               </a:ext>
             </a:extLst>
           </a:blip>
@@ -19459,7 +19644,7 @@
                 <a14:useLocalDpi xmlns:a14="http://schemas.microsoft.com/office/drawing/2010/main" val="0"/>
               </a:ext>
               <a:ext uri="{96DAC541-7B7A-43D3-8B79-37D633B846F1}">
-                <asvg:svgBlip xmlns:asvg="http://schemas.microsoft.com/office/drawing/2016/SVG/main" r:embed="rId5"/>
+                <asvg:svgBlip xmlns:asvg="http://schemas.microsoft.com/office/drawing/2016/SVG/main" xmlns="" r:embed="rId5"/>
               </a:ext>
             </a:extLst>
           </a:blip>
@@ -19840,7 +20025,7 @@
                 <a14:useLocalDpi xmlns:a14="http://schemas.microsoft.com/office/drawing/2010/main" val="0"/>
               </a:ext>
               <a:ext uri="{96DAC541-7B7A-43D3-8B79-37D633B846F1}">
-                <asvg:svgBlip xmlns:asvg="http://schemas.microsoft.com/office/drawing/2016/SVG/main" r:embed="rId3"/>
+                <asvg:svgBlip xmlns:asvg="http://schemas.microsoft.com/office/drawing/2016/SVG/main" xmlns="" r:embed="rId3"/>
               </a:ext>
             </a:extLst>
           </a:blip>
@@ -19886,21 +20071,21 @@
                 <a:gridCol w="2129160">
                   <a:extLst>
                     <a:ext uri="{9D8B030D-6E8A-4147-A177-3AD203B41FA5}">
-                      <a16:colId xmlns:a16="http://schemas.microsoft.com/office/drawing/2014/main" val="4133284766"/>
+                      <a16:colId xmlns:a16="http://schemas.microsoft.com/office/drawing/2014/main" xmlns="" val="4133284766"/>
                     </a:ext>
                   </a:extLst>
                 </a:gridCol>
                 <a:gridCol w="2918012">
                   <a:extLst>
                     <a:ext uri="{9D8B030D-6E8A-4147-A177-3AD203B41FA5}">
-                      <a16:colId xmlns:a16="http://schemas.microsoft.com/office/drawing/2014/main" val="718929099"/>
+                      <a16:colId xmlns:a16="http://schemas.microsoft.com/office/drawing/2014/main" xmlns="" val="718929099"/>
                     </a:ext>
                   </a:extLst>
                 </a:gridCol>
                 <a:gridCol w="3080827">
                   <a:extLst>
                     <a:ext uri="{9D8B030D-6E8A-4147-A177-3AD203B41FA5}">
-                      <a16:colId xmlns:a16="http://schemas.microsoft.com/office/drawing/2014/main" val="3397314702"/>
+                      <a16:colId xmlns:a16="http://schemas.microsoft.com/office/drawing/2014/main" xmlns="" val="3397314702"/>
                     </a:ext>
                   </a:extLst>
                 </a:gridCol>
@@ -19950,7 +20135,7 @@
                 </a:tc>
                 <a:extLst>
                   <a:ext uri="{0D108BD9-81ED-4DB2-BD59-A6C34878D82A}">
-                    <a16:rowId xmlns:a16="http://schemas.microsoft.com/office/drawing/2014/main" val="2748388400"/>
+                    <a16:rowId xmlns:a16="http://schemas.microsoft.com/office/drawing/2014/main" xmlns="" val="2748388400"/>
                   </a:ext>
                 </a:extLst>
               </a:tr>
@@ -20034,7 +20219,7 @@
                 </a:tc>
                 <a:extLst>
                   <a:ext uri="{0D108BD9-81ED-4DB2-BD59-A6C34878D82A}">
-                    <a16:rowId xmlns:a16="http://schemas.microsoft.com/office/drawing/2014/main" val="2210115443"/>
+                    <a16:rowId xmlns:a16="http://schemas.microsoft.com/office/drawing/2014/main" xmlns="" val="2210115443"/>
                   </a:ext>
                 </a:extLst>
               </a:tr>
@@ -20088,7 +20273,7 @@
                 </a:tc>
                 <a:extLst>
                   <a:ext uri="{0D108BD9-81ED-4DB2-BD59-A6C34878D82A}">
-                    <a16:rowId xmlns:a16="http://schemas.microsoft.com/office/drawing/2014/main" val="2291241857"/>
+                    <a16:rowId xmlns:a16="http://schemas.microsoft.com/office/drawing/2014/main" xmlns="" val="2291241857"/>
                   </a:ext>
                 </a:extLst>
               </a:tr>
@@ -20105,7 +20290,7 @@
           <p:nvPr>
             <p:extLst>
               <p:ext uri="{D42A27DB-BD31-4B8C-83A1-F6EECF244321}">
-                <p14:modId xmlns:p14="http://schemas.microsoft.com/office/powerpoint/2010/main" val="1407991198"/>
+                <p14:modId xmlns:p14="http://schemas.microsoft.com/office/powerpoint/2010/main" val="498073031"/>
               </p:ext>
             </p:extLst>
           </p:nvPr>
@@ -20124,7 +20309,7 @@
                 <a:gridCol w="3630834">
                   <a:extLst>
                     <a:ext uri="{9D8B030D-6E8A-4147-A177-3AD203B41FA5}">
-                      <a16:colId xmlns:a16="http://schemas.microsoft.com/office/drawing/2014/main" val="1543427365"/>
+                      <a16:colId xmlns:a16="http://schemas.microsoft.com/office/drawing/2014/main" xmlns="" val="1543427365"/>
                     </a:ext>
                   </a:extLst>
                 </a:gridCol>
@@ -20148,7 +20333,7 @@
                 </a:tc>
                 <a:extLst>
                   <a:ext uri="{0D108BD9-81ED-4DB2-BD59-A6C34878D82A}">
-                    <a16:rowId xmlns:a16="http://schemas.microsoft.com/office/drawing/2014/main" val="3469238215"/>
+                    <a16:rowId xmlns:a16="http://schemas.microsoft.com/office/drawing/2014/main" xmlns="" val="3469238215"/>
                   </a:ext>
                 </a:extLst>
               </a:tr>
@@ -20177,7 +20362,7 @@
                 </a:tc>
                 <a:extLst>
                   <a:ext uri="{0D108BD9-81ED-4DB2-BD59-A6C34878D82A}">
-                    <a16:rowId xmlns:a16="http://schemas.microsoft.com/office/drawing/2014/main" val="767070048"/>
+                    <a16:rowId xmlns:a16="http://schemas.microsoft.com/office/drawing/2014/main" xmlns="" val="767070048"/>
                   </a:ext>
                 </a:extLst>
               </a:tr>
@@ -20196,8 +20381,8 @@
                         <a:t>Eine erwartete </a:t>
                       </a:r>
                       <a:r>
-                        <a:rPr lang="de-CH" dirty="0" err="1"/>
-                        <a:t>Zusnahme</a:t>
+                        <a:rPr lang="de-CH" dirty="0" smtClean="0"/>
+                        <a:t>Zunahme</a:t>
                       </a:r>
                       <a:endParaRPr lang="de-CH" dirty="0"/>
                     </a:p>
@@ -20211,8 +20396,8 @@
                         <a:t>Sonst </a:t>
                       </a:r>
                       <a:r>
-                        <a:rPr lang="de-CH" dirty="0" err="1"/>
-                        <a:t>konstand</a:t>
+                        <a:rPr lang="de-CH" dirty="0" smtClean="0"/>
+                        <a:t>konstant</a:t>
                       </a:r>
                       <a:endParaRPr lang="de-CH" dirty="0"/>
                     </a:p>
@@ -20221,7 +20406,7 @@
                 </a:tc>
                 <a:extLst>
                   <a:ext uri="{0D108BD9-81ED-4DB2-BD59-A6C34878D82A}">
-                    <a16:rowId xmlns:a16="http://schemas.microsoft.com/office/drawing/2014/main" val="1662214006"/>
+                    <a16:rowId xmlns:a16="http://schemas.microsoft.com/office/drawing/2014/main" xmlns="" val="1662214006"/>
                   </a:ext>
                 </a:extLst>
               </a:tr>
@@ -20836,7 +21021,7 @@
                 <a14:useLocalDpi xmlns:a14="http://schemas.microsoft.com/office/drawing/2010/main" val="0"/>
               </a:ext>
               <a:ext uri="{96DAC541-7B7A-43D3-8B79-37D633B846F1}">
-                <asvg:svgBlip xmlns:asvg="http://schemas.microsoft.com/office/drawing/2016/SVG/main" r:embed="rId4"/>
+                <asvg:svgBlip xmlns:asvg="http://schemas.microsoft.com/office/drawing/2016/SVG/main" xmlns="" r:embed="rId4"/>
               </a:ext>
             </a:extLst>
           </a:blip>
@@ -21202,6 +21387,10 @@
           </a:bodyPr>
           <a:lstStyle/>
           <a:p>
+            <a:r>
+              <a:rPr lang="de-DE" dirty="0"/>
+              <a:t/>
+            </a:r>
             <a:br>
               <a:rPr lang="de-DE" dirty="0"/>
             </a:br>
@@ -21459,7 +21648,7 @@
                 <a14:useLocalDpi xmlns:a14="http://schemas.microsoft.com/office/drawing/2010/main" val="0"/>
               </a:ext>
               <a:ext uri="{96DAC541-7B7A-43D3-8B79-37D633B846F1}">
-                <asvg:svgBlip xmlns:asvg="http://schemas.microsoft.com/office/drawing/2016/SVG/main" r:embed="rId8"/>
+                <asvg:svgBlip xmlns:asvg="http://schemas.microsoft.com/office/drawing/2016/SVG/main" xmlns="" r:embed="rId8"/>
               </a:ext>
             </a:extLst>
           </a:blip>

</xml_diff>